<commit_message>
Botones de escape añadidos
</commit_message>
<xml_diff>
--- a/doc/Storyboard.pptx
+++ b/doc/Storyboard.pptx
@@ -2,13 +2,13 @@
 <file path=ppt/presentation.xml><?xml version="1.0" encoding="utf-8"?>
 <p:presentation xmlns:a="http://schemas.openxmlformats.org/drawingml/2006/main" xmlns:r="http://schemas.openxmlformats.org/officeDocument/2006/relationships" xmlns:p="http://schemas.openxmlformats.org/presentationml/2006/main" saveSubsetFonts="1">
   <p:sldMasterIdLst>
-    <p:sldMasterId id="2147483648" r:id="rId54"/>
+    <p:sldMasterId id="2147483648" r:id="rId61"/>
   </p:sldMasterIdLst>
   <p:sldIdLst>
-    <p:sldId id="257" r:id="rId55"/>
-    <p:sldId id="256" r:id="rId56"/>
-    <p:sldId id="259" r:id="rId57"/>
-    <p:sldId id="258" r:id="rId58"/>
+    <p:sldId id="257" r:id="rId62"/>
+    <p:sldId id="256" r:id="rId63"/>
+    <p:sldId id="259" r:id="rId64"/>
+    <p:sldId id="258" r:id="rId65"/>
   </p:sldIdLst>
   <p:sldSz cx="12192000" cy="6858000"/>
   <p:notesSz cx="6858000" cy="9144000"/>
@@ -107,6 +107,11 @@
       </a:defRPr>
     </a:lvl9pPr>
   </p:defaultTextStyle>
+  <p:extLst>
+    <p:ext uri="{EFAFB233-063F-42B5-8137-9DF3F51BA10A}">
+      <p15:sldGuideLst xmlns:p15="http://schemas.microsoft.com/office/powerpoint/2012/main"/>
+    </p:ext>
+  </p:extLst>
 </p:presentation>
 </file>
 
@@ -3860,7 +3865,7 @@
             <p:nvPr/>
           </p:nvPicPr>
           <p:blipFill>
-            <a:blip r:embed="rId25">
+            <a:blip r:embed="rId26">
               <a:lum bright="70000" contrast="-70000"/>
               <a:extLst>
                 <a:ext uri="{28A0092B-C50C-407E-A947-70E740481C1C}">
@@ -3959,10 +3964,6 @@
               </a:rPr>
               <a:t>2</a:t>
             </a:r>
-            <a:endParaRPr lang="es-ES" sz="2800" dirty="0">
-              <a:latin typeface="SF Text" panose="00000500000000000000" pitchFamily="50" charset="0"/>
-              <a:ea typeface="SF Text" panose="00000500000000000000" pitchFamily="50" charset="0"/>
-            </a:endParaRPr>
           </a:p>
         </p:txBody>
       </p:sp>
@@ -4270,7 +4271,7 @@
             <p:cNvSpPr/>
             <p:nvPr>
               <p:custDataLst>
-                <p:custData r:id="rId23"/>
+                <p:custData r:id="rId24"/>
               </p:custDataLst>
             </p:nvPr>
           </p:nvSpPr>
@@ -4366,7 +4367,6 @@
                 <a:rPr lang="en-US" sz="1200" dirty="0"/>
                 <a:t>2</a:t>
               </a:r>
-              <a:endParaRPr lang="en-US" sz="1200" dirty="0"/>
             </a:p>
           </p:txBody>
         </p:sp>
@@ -4395,7 +4395,7 @@
             <p:cNvSpPr/>
             <p:nvPr>
               <p:custDataLst>
-                <p:custData r:id="rId22"/>
+                <p:custData r:id="rId23"/>
               </p:custDataLst>
             </p:nvPr>
           </p:nvSpPr>
@@ -4520,7 +4520,7 @@
             <p:cNvSpPr/>
             <p:nvPr>
               <p:custDataLst>
-                <p:custData r:id="rId21"/>
+                <p:custData r:id="rId22"/>
               </p:custDataLst>
             </p:nvPr>
           </p:nvSpPr>
@@ -4634,7 +4634,7 @@
           </p:nvPr>
         </p:nvPicPr>
         <p:blipFill rotWithShape="1">
-          <a:blip r:embed="rId26">
+          <a:blip r:embed="rId27">
             <a:extLst>
               <a:ext uri="{28A0092B-C50C-407E-A947-70E740481C1C}">
                 <a14:useLocalDpi xmlns:a14="http://schemas.microsoft.com/office/drawing/2010/main" val="0"/>
@@ -4710,14 +4710,7 @@
                 <a:latin typeface="SF Display" panose="00000500000000000000" pitchFamily="50" charset="0"/>
                 <a:ea typeface="SF Display" panose="00000500000000000000" pitchFamily="50" charset="0"/>
               </a:rPr>
-              <a:t> </a:t>
-            </a:r>
-            <a:r>
-              <a:rPr lang="en-US" dirty="0" smtClean="0">
-                <a:latin typeface="SF Display" panose="00000500000000000000" pitchFamily="50" charset="0"/>
-                <a:ea typeface="SF Display" panose="00000500000000000000" pitchFamily="50" charset="0"/>
-              </a:rPr>
-              <a:t>#1</a:t>
+              <a:t> #1</a:t>
             </a:r>
             <a:endParaRPr lang="en-US" dirty="0">
               <a:latin typeface="SF Display" panose="00000500000000000000" pitchFamily="50" charset="0"/>
@@ -5170,31 +5163,38 @@
             <a:pPr algn="ctr"/>
             <a:r>
               <a:rPr lang="en-US" sz="1200" dirty="0" smtClean="0">
-                <a:solidFill>
-                  <a:srgbClr val="000000"/>
-                </a:solidFill>
                 <a:latin typeface="SF Display" panose="00000500000000000000" pitchFamily="50" charset="0"/>
                 <a:ea typeface="SF Display" panose="00000500000000000000" pitchFamily="50" charset="0"/>
                 <a:cs typeface="Segoe UI Semibold" pitchFamily="34" charset="0"/>
               </a:rPr>
-              <a:t>Un </a:t>
+              <a:t>El </a:t>
             </a:r>
             <a:r>
               <a:rPr lang="en-US" sz="1200" dirty="0" err="1" smtClean="0">
-                <a:solidFill>
-                  <a:srgbClr val="000000"/>
-                </a:solidFill>
                 <a:latin typeface="SF Display" panose="00000500000000000000" pitchFamily="50" charset="0"/>
                 <a:ea typeface="SF Display" panose="00000500000000000000" pitchFamily="50" charset="0"/>
                 <a:cs typeface="Segoe UI Semibold" pitchFamily="34" charset="0"/>
               </a:rPr>
-              <a:t>coche</a:t>
+              <a:t>motivo</a:t>
             </a:r>
             <a:r>
               <a:rPr lang="en-US" sz="1200" dirty="0" smtClean="0">
-                <a:solidFill>
-                  <a:srgbClr val="000000"/>
-                </a:solidFill>
+                <a:latin typeface="SF Display" panose="00000500000000000000" pitchFamily="50" charset="0"/>
+                <a:ea typeface="SF Display" panose="00000500000000000000" pitchFamily="50" charset="0"/>
+                <a:cs typeface="Segoe UI Semibold" pitchFamily="34" charset="0"/>
+              </a:rPr>
+              <a:t> de </a:t>
+            </a:r>
+            <a:r>
+              <a:rPr lang="en-US" sz="1200" dirty="0" err="1" smtClean="0">
+                <a:latin typeface="SF Display" panose="00000500000000000000" pitchFamily="50" charset="0"/>
+                <a:ea typeface="SF Display" panose="00000500000000000000" pitchFamily="50" charset="0"/>
+                <a:cs typeface="Segoe UI Semibold" pitchFamily="34" charset="0"/>
+              </a:rPr>
+              <a:t>nuestro</a:t>
+            </a:r>
+            <a:r>
+              <a:rPr lang="en-US" sz="1200" dirty="0" smtClean="0">
                 <a:latin typeface="SF Display" panose="00000500000000000000" pitchFamily="50" charset="0"/>
                 <a:ea typeface="SF Display" panose="00000500000000000000" pitchFamily="50" charset="0"/>
                 <a:cs typeface="Segoe UI Semibold" pitchFamily="34" charset="0"/>
@@ -5203,14 +5203,11 @@
             </a:r>
             <a:r>
               <a:rPr lang="en-US" sz="1200" dirty="0" err="1" smtClean="0">
-                <a:solidFill>
-                  <a:srgbClr val="000000"/>
-                </a:solidFill>
                 <a:latin typeface="SF Display" panose="00000500000000000000" pitchFamily="50" charset="0"/>
                 <a:ea typeface="SF Display" panose="00000500000000000000" pitchFamily="50" charset="0"/>
                 <a:cs typeface="Segoe UI Semibold" pitchFamily="34" charset="0"/>
               </a:rPr>
-              <a:t>ecológico</a:t>
+              <a:t>sufrimiento</a:t>
             </a:r>
             <a:endParaRPr lang="en-US" sz="1200" dirty="0">
               <a:solidFill>
@@ -5285,7 +5282,7 @@
           <p:nvPr/>
         </p:nvPicPr>
         <p:blipFill>
-          <a:blip r:embed="rId25">
+          <a:blip r:embed="rId26">
             <a:lum bright="70000" contrast="-70000"/>
             <a:extLst>
               <a:ext uri="{28A0092B-C50C-407E-A947-70E740481C1C}">
@@ -5392,7 +5389,7 @@
           <p:nvPr/>
         </p:nvPicPr>
         <p:blipFill>
-          <a:blip r:embed="rId27" cstate="print">
+          <a:blip r:embed="rId28" cstate="print">
             <a:extLst>
               <a:ext uri="{28A0092B-C50C-407E-A947-70E740481C1C}">
                 <a14:useLocalDpi xmlns:a14="http://schemas.microsoft.com/office/drawing/2010/main" val="0"/>
@@ -5406,8 +5403,8 @@
         </p:blipFill>
         <p:spPr bwMode="auto">
           <a:xfrm>
-            <a:off x="7821228" y="1851018"/>
-            <a:ext cx="1791050" cy="934380"/>
+            <a:off x="8013290" y="1908486"/>
+            <a:ext cx="1511458" cy="788519"/>
           </a:xfrm>
           <a:prstGeom prst="rect">
             <a:avLst/>
@@ -5448,7 +5445,7 @@
             <p:cNvSpPr/>
             <p:nvPr>
               <p:custDataLst>
-                <p:custData r:id="rId20"/>
+                <p:custData r:id="rId21"/>
               </p:custDataLst>
             </p:nvPr>
           </p:nvSpPr>
@@ -5544,7 +5541,6 @@
                 <a:rPr lang="en-US" sz="1200" dirty="0"/>
                 <a:t>2</a:t>
               </a:r>
-              <a:endParaRPr lang="en-US" sz="1200" dirty="0"/>
             </a:p>
           </p:txBody>
         </p:sp>
@@ -5573,7 +5569,7 @@
             <p:cNvSpPr/>
             <p:nvPr>
               <p:custDataLst>
-                <p:custData r:id="rId19"/>
+                <p:custData r:id="rId20"/>
               </p:custDataLst>
             </p:nvPr>
           </p:nvSpPr>
@@ -5669,7 +5665,6 @@
                 <a:rPr lang="en-US" sz="1200" dirty="0"/>
                 <a:t>3</a:t>
               </a:r>
-              <a:endParaRPr lang="en-US" sz="1200" dirty="0"/>
             </a:p>
           </p:txBody>
         </p:sp>
@@ -5744,6 +5739,51 @@
           </a:p>
         </p:txBody>
       </p:sp>
+      <p:pic>
+        <p:nvPicPr>
+          <p:cNvPr id="58" name="Picture 2" descr="C:\Users\t-dantay\Documents\First24\error1.png"/>
+          <p:cNvPicPr>
+            <a:picLocks noChangeAspect="1" noChangeArrowheads="1"/>
+          </p:cNvPicPr>
+          <p:nvPr>
+            <p:custDataLst>
+              <p:custData r:id="rId19"/>
+            </p:custDataLst>
+          </p:nvPr>
+        </p:nvPicPr>
+        <p:blipFill>
+          <a:blip r:embed="rId29" cstate="print">
+            <a:extLst>
+              <a:ext uri="{28A0092B-C50C-407E-A947-70E740481C1C}">
+                <a14:useLocalDpi xmlns:a14="http://schemas.microsoft.com/office/drawing/2010/main" val="0"/>
+              </a:ext>
+            </a:extLst>
+          </a:blip>
+          <a:srcRect/>
+          <a:stretch>
+            <a:fillRect/>
+          </a:stretch>
+        </p:blipFill>
+        <p:spPr bwMode="auto">
+          <a:xfrm>
+            <a:off x="9826659" y="1027683"/>
+            <a:ext cx="228600" cy="228600"/>
+          </a:xfrm>
+          <a:prstGeom prst="rect">
+            <a:avLst/>
+          </a:prstGeom>
+          <a:noFill/>
+          <a:extLst>
+            <a:ext uri="{909E8E84-426E-40DD-AFC4-6F175D3DCCD1}">
+              <a14:hiddenFill xmlns:a14="http://schemas.microsoft.com/office/drawing/2010/main">
+                <a:solidFill>
+                  <a:srgbClr val="FFFFFF"/>
+                </a:solidFill>
+              </a14:hiddenFill>
+            </a:ext>
+          </a:extLst>
+        </p:spPr>
+      </p:pic>
     </p:spTree>
     <p:extLst>
       <p:ext uri="{BB962C8B-B14F-4D97-AF65-F5344CB8AC3E}">
@@ -6491,7 +6531,7 @@
             <p:nvPr/>
           </p:nvPicPr>
           <p:blipFill>
-            <a:blip r:embed="rId27">
+            <a:blip r:embed="rId33">
               <a:lum bright="70000" contrast="-70000"/>
               <a:extLst>
                 <a:ext uri="{28A0092B-C50C-407E-A947-70E740481C1C}">
@@ -6554,10 +6594,6 @@
               </a:rPr>
               <a:t>3</a:t>
             </a:r>
-            <a:endParaRPr lang="es-ES" sz="2800" dirty="0">
-              <a:latin typeface="SF Text" panose="00000500000000000000" pitchFamily="50" charset="0"/>
-              <a:ea typeface="SF Text" panose="00000500000000000000" pitchFamily="50" charset="0"/>
-            </a:endParaRPr>
           </a:p>
         </p:txBody>
       </p:sp>
@@ -6609,7 +6645,7 @@
         </p:nvSpPr>
         <p:spPr>
           <a:xfrm>
-            <a:off x="2291938" y="1021985"/>
+            <a:off x="2291938" y="1034327"/>
             <a:ext cx="2089711" cy="419305"/>
           </a:xfrm>
           <a:prstGeom prst="rect">
@@ -6642,27 +6678,27 @@
           <a:p>
             <a:pPr algn="ctr"/>
             <a:r>
-              <a:rPr lang="en-US" sz="2400" dirty="0" smtClean="0">
+              <a:rPr lang="en-US" b="1" dirty="0" smtClean="0">
                 <a:latin typeface="SF Text" panose="00000500000000000000" pitchFamily="50" charset="0"/>
                 <a:ea typeface="SF Text" panose="00000500000000000000" pitchFamily="50" charset="0"/>
               </a:rPr>
               <a:t>¡Has </a:t>
             </a:r>
             <a:r>
-              <a:rPr lang="en-US" sz="2400" dirty="0" err="1" smtClean="0">
+              <a:rPr lang="en-US" b="1" dirty="0" err="1" smtClean="0">
                 <a:latin typeface="SF Text" panose="00000500000000000000" pitchFamily="50" charset="0"/>
                 <a:ea typeface="SF Text" panose="00000500000000000000" pitchFamily="50" charset="0"/>
               </a:rPr>
               <a:t>fallado</a:t>
             </a:r>
             <a:r>
-              <a:rPr lang="en-US" sz="2400" dirty="0" smtClean="0">
+              <a:rPr lang="en-US" b="1" dirty="0" smtClean="0">
                 <a:latin typeface="SF Text" panose="00000500000000000000" pitchFamily="50" charset="0"/>
                 <a:ea typeface="SF Text" panose="00000500000000000000" pitchFamily="50" charset="0"/>
               </a:rPr>
               <a:t>!</a:t>
             </a:r>
-            <a:endParaRPr lang="en-US" sz="2400" dirty="0">
+            <a:endParaRPr lang="en-US" b="1" dirty="0">
               <a:latin typeface="SF Text" panose="00000500000000000000" pitchFamily="50" charset="0"/>
               <a:ea typeface="SF Text" panose="00000500000000000000" pitchFamily="50" charset="0"/>
             </a:endParaRPr>
@@ -6731,7 +6767,7 @@
           <p:nvPr/>
         </p:nvPicPr>
         <p:blipFill>
-          <a:blip r:embed="rId27">
+          <a:blip r:embed="rId33">
             <a:lum bright="70000" contrast="-70000"/>
             <a:extLst>
               <a:ext uri="{28A0092B-C50C-407E-A947-70E740481C1C}">
@@ -6776,7 +6812,7 @@
         </p:nvSpPr>
         <p:spPr>
           <a:xfrm>
-            <a:off x="2550490" y="2064802"/>
+            <a:off x="2550489" y="1870411"/>
             <a:ext cx="1609393" cy="370014"/>
           </a:xfrm>
           <a:prstGeom prst="rect">
@@ -6834,7 +6870,7 @@
         </p:nvSpPr>
         <p:spPr>
           <a:xfrm>
-            <a:off x="2370657" y="2476092"/>
+            <a:off x="2375278" y="2157696"/>
             <a:ext cx="1609393" cy="370014"/>
           </a:xfrm>
           <a:prstGeom prst="rect">
@@ -6899,7 +6935,7 @@
           </p:nvPr>
         </p:nvPicPr>
         <p:blipFill rotWithShape="1">
-          <a:blip r:embed="rId28">
+          <a:blip r:embed="rId34">
             <a:extLst>
               <a:ext uri="{28A0092B-C50C-407E-A947-70E740481C1C}">
                 <a14:useLocalDpi xmlns:a14="http://schemas.microsoft.com/office/drawing/2010/main" val="0"/>
@@ -6911,7 +6947,7 @@
         </p:blipFill>
         <p:spPr>
           <a:xfrm flipV="1">
-            <a:off x="3106223" y="1475751"/>
+            <a:off x="3057883" y="1386008"/>
             <a:ext cx="452855" cy="434462"/>
           </a:xfrm>
           <a:prstGeom prst="rect">
@@ -6931,7 +6967,7 @@
         </p:nvSpPr>
         <p:spPr>
           <a:xfrm>
-            <a:off x="2370657" y="2771532"/>
+            <a:off x="2375278" y="2453136"/>
             <a:ext cx="1709765" cy="370014"/>
           </a:xfrm>
           <a:prstGeom prst="rect">
@@ -6995,7 +7031,7 @@
         </p:nvSpPr>
         <p:spPr>
           <a:xfrm>
-            <a:off x="2354221" y="2946016"/>
+            <a:off x="2358842" y="2627620"/>
             <a:ext cx="2119471" cy="1024265"/>
           </a:xfrm>
           <a:prstGeom prst="rect">
@@ -7112,7 +7148,7 @@
         </p:nvSpPr>
         <p:spPr>
           <a:xfrm>
-            <a:off x="2507080" y="4350832"/>
+            <a:off x="2511701" y="4032436"/>
             <a:ext cx="1696212" cy="307773"/>
           </a:xfrm>
           <a:prstGeom prst="rect">
@@ -7182,14 +7218,14 @@
           <p:nvPr/>
         </p:nvPicPr>
         <p:blipFill>
-          <a:blip r:embed="rId29"/>
+          <a:blip r:embed="rId35"/>
           <a:stretch>
             <a:fillRect/>
           </a:stretch>
         </p:blipFill>
         <p:spPr>
           <a:xfrm>
-            <a:off x="3057883" y="3824025"/>
+            <a:off x="3062504" y="3505629"/>
             <a:ext cx="594606" cy="500505"/>
           </a:xfrm>
           <a:prstGeom prst="rect">
@@ -7209,7 +7245,7 @@
         </p:nvGrpSpPr>
         <p:grpSpPr>
           <a:xfrm>
-            <a:off x="4051730" y="4177943"/>
+            <a:off x="4012507" y="3866658"/>
             <a:ext cx="320451" cy="319476"/>
             <a:chOff x="4283964" y="3147930"/>
             <a:chExt cx="320451" cy="319476"/>
@@ -7221,7 +7257,7 @@
             <p:cNvSpPr/>
             <p:nvPr>
               <p:custDataLst>
-                <p:custData r:id="rId25"/>
+                <p:custData r:id="rId31"/>
               </p:custDataLst>
             </p:nvPr>
           </p:nvSpPr>
@@ -7334,7 +7370,7 @@
         </p:nvSpPr>
         <p:spPr>
           <a:xfrm>
-            <a:off x="2507080" y="4907602"/>
+            <a:off x="2511701" y="4511128"/>
             <a:ext cx="1696212" cy="307773"/>
           </a:xfrm>
           <a:prstGeom prst="rect">
@@ -7424,7 +7460,7 @@
         </p:nvGrpSpPr>
         <p:grpSpPr>
           <a:xfrm>
-            <a:off x="4048237" y="4759925"/>
+            <a:off x="4008986" y="4398697"/>
             <a:ext cx="320451" cy="319476"/>
             <a:chOff x="4283964" y="3147930"/>
             <a:chExt cx="320451" cy="319476"/>
@@ -7436,7 +7472,7 @@
             <p:cNvSpPr/>
             <p:nvPr>
               <p:custDataLst>
-                <p:custData r:id="rId24"/>
+                <p:custData r:id="rId30"/>
               </p:custDataLst>
             </p:nvPr>
           </p:nvSpPr>
@@ -7582,27 +7618,27 @@
           <a:p>
             <a:pPr algn="ctr"/>
             <a:r>
-              <a:rPr lang="en-US" sz="2400" dirty="0" smtClean="0">
+              <a:rPr lang="en-US" b="1" dirty="0" smtClean="0">
                 <a:latin typeface="SF Text" panose="00000500000000000000" pitchFamily="50" charset="0"/>
                 <a:ea typeface="SF Text" panose="00000500000000000000" pitchFamily="50" charset="0"/>
               </a:rPr>
               <a:t>¡</a:t>
             </a:r>
             <a:r>
-              <a:rPr lang="en-US" sz="2400" dirty="0" err="1" smtClean="0">
+              <a:rPr lang="en-US" b="1" dirty="0" err="1" smtClean="0">
                 <a:latin typeface="SF Text" panose="00000500000000000000" pitchFamily="50" charset="0"/>
                 <a:ea typeface="SF Text" panose="00000500000000000000" pitchFamily="50" charset="0"/>
               </a:rPr>
               <a:t>Enhorabuena</a:t>
             </a:r>
             <a:r>
-              <a:rPr lang="en-US" sz="2400" dirty="0" smtClean="0">
+              <a:rPr lang="en-US" b="1" dirty="0" smtClean="0">
                 <a:latin typeface="SF Text" panose="00000500000000000000" pitchFamily="50" charset="0"/>
                 <a:ea typeface="SF Text" panose="00000500000000000000" pitchFamily="50" charset="0"/>
               </a:rPr>
               <a:t>!</a:t>
             </a:r>
-            <a:endParaRPr lang="en-US" sz="2400" dirty="0">
+            <a:endParaRPr lang="en-US" b="1" dirty="0">
               <a:latin typeface="SF Text" panose="00000500000000000000" pitchFamily="50" charset="0"/>
               <a:ea typeface="SF Text" panose="00000500000000000000" pitchFamily="50" charset="0"/>
             </a:endParaRPr>
@@ -7692,7 +7728,7 @@
           </p:nvPr>
         </p:nvPicPr>
         <p:blipFill rotWithShape="1">
-          <a:blip r:embed="rId30">
+          <a:blip r:embed="rId36">
             <a:extLst>
               <a:ext uri="{28A0092B-C50C-407E-A947-70E740481C1C}">
                 <a14:useLocalDpi xmlns:a14="http://schemas.microsoft.com/office/drawing/2010/main" val="0"/>
@@ -7704,7 +7740,7 @@
         </p:blipFill>
         <p:spPr>
           <a:xfrm>
-            <a:off x="8573553" y="1485262"/>
+            <a:off x="8595690" y="1399768"/>
             <a:ext cx="455738" cy="411502"/>
           </a:xfrm>
           <a:prstGeom prst="rect">
@@ -7724,7 +7760,7 @@
         </p:nvSpPr>
         <p:spPr>
           <a:xfrm>
-            <a:off x="8018863" y="2037659"/>
+            <a:off x="8038713" y="1833392"/>
             <a:ext cx="1609393" cy="370014"/>
           </a:xfrm>
           <a:prstGeom prst="rect">
@@ -7782,7 +7818,7 @@
         </p:nvSpPr>
         <p:spPr>
           <a:xfrm>
-            <a:off x="7839030" y="2448949"/>
+            <a:off x="7849169" y="2143925"/>
             <a:ext cx="1609393" cy="370014"/>
           </a:xfrm>
           <a:prstGeom prst="rect">
@@ -7846,7 +7882,7 @@
         </p:nvSpPr>
         <p:spPr>
           <a:xfrm>
-            <a:off x="7839030" y="2744389"/>
+            <a:off x="7849169" y="2439365"/>
             <a:ext cx="1709765" cy="370014"/>
           </a:xfrm>
           <a:prstGeom prst="rect">
@@ -7910,7 +7946,7 @@
         </p:nvSpPr>
         <p:spPr>
           <a:xfrm>
-            <a:off x="7822594" y="2918873"/>
+            <a:off x="7832733" y="2613849"/>
             <a:ext cx="2119471" cy="1024265"/>
           </a:xfrm>
           <a:prstGeom prst="rect">
@@ -8027,7 +8063,7 @@
         </p:nvSpPr>
         <p:spPr>
           <a:xfrm>
-            <a:off x="7989887" y="4341210"/>
+            <a:off x="8000026" y="4036186"/>
             <a:ext cx="1696212" cy="307773"/>
           </a:xfrm>
           <a:prstGeom prst="rect">
@@ -8097,14 +8133,14 @@
           <p:nvPr/>
         </p:nvPicPr>
         <p:blipFill>
-          <a:blip r:embed="rId29"/>
+          <a:blip r:embed="rId35"/>
           <a:stretch>
             <a:fillRect/>
           </a:stretch>
         </p:blipFill>
         <p:spPr>
           <a:xfrm>
-            <a:off x="8540690" y="3814403"/>
+            <a:off x="8550829" y="3509379"/>
             <a:ext cx="594606" cy="500505"/>
           </a:xfrm>
           <a:prstGeom prst="rect">
@@ -8124,7 +8160,7 @@
         </p:nvSpPr>
         <p:spPr>
           <a:xfrm>
-            <a:off x="7989887" y="4897980"/>
+            <a:off x="8000026" y="4520862"/>
             <a:ext cx="1696212" cy="307773"/>
           </a:xfrm>
           <a:prstGeom prst="rect">
@@ -8214,7 +8250,7 @@
         </p:nvGrpSpPr>
         <p:grpSpPr>
           <a:xfrm>
-            <a:off x="9506062" y="4136037"/>
+            <a:off x="9476603" y="3807612"/>
             <a:ext cx="320451" cy="319476"/>
             <a:chOff x="4283964" y="3147930"/>
             <a:chExt cx="320451" cy="319476"/>
@@ -8226,7 +8262,7 @@
             <p:cNvSpPr/>
             <p:nvPr>
               <p:custDataLst>
-                <p:custData r:id="rId23"/>
+                <p:custData r:id="rId29"/>
               </p:custDataLst>
             </p:nvPr>
           </p:nvSpPr>
@@ -8339,7 +8375,7 @@
         </p:nvGrpSpPr>
         <p:grpSpPr>
           <a:xfrm>
-            <a:off x="9520349" y="4731350"/>
+            <a:off x="9476603" y="4365422"/>
             <a:ext cx="320451" cy="319476"/>
             <a:chOff x="4283964" y="3147930"/>
             <a:chExt cx="320451" cy="319476"/>
@@ -8351,7 +8387,7 @@
             <p:cNvSpPr/>
             <p:nvPr>
               <p:custDataLst>
-                <p:custData r:id="rId22"/>
+                <p:custData r:id="rId28"/>
               </p:custDataLst>
             </p:nvPr>
           </p:nvSpPr>
@@ -8424,6 +8460,474 @@
         <p:sp>
           <p:nvSpPr>
             <p:cNvPr id="118" name="Content"/>
+            <p:cNvSpPr txBox="1"/>
+            <p:nvPr/>
+          </p:nvSpPr>
+          <p:spPr>
+            <a:xfrm flipH="1">
+              <a:off x="4309771" y="3157455"/>
+              <a:ext cx="268835" cy="276999"/>
+            </a:xfrm>
+            <a:prstGeom prst="rect">
+              <a:avLst/>
+            </a:prstGeom>
+            <a:noFill/>
+          </p:spPr>
+          <p:txBody>
+            <a:bodyPr wrap="square" rtlCol="0">
+              <a:spAutoFit/>
+            </a:bodyPr>
+            <a:lstStyle/>
+            <a:p>
+              <a:r>
+                <a:rPr lang="en-US" sz="1200" dirty="0" smtClean="0"/>
+                <a:t>1</a:t>
+              </a:r>
+              <a:endParaRPr lang="en-US" sz="1200" dirty="0"/>
+            </a:p>
+          </p:txBody>
+        </p:sp>
+      </p:grpSp>
+      <p:sp>
+        <p:nvSpPr>
+          <p:cNvPr id="55" name="Content"/>
+          <p:cNvSpPr/>
+          <p:nvPr>
+            <p:custDataLst>
+              <p:custData r:id="rId22"/>
+            </p:custDataLst>
+          </p:nvPr>
+        </p:nvSpPr>
+        <p:spPr>
+          <a:xfrm>
+            <a:off x="2510528" y="4984679"/>
+            <a:ext cx="1696212" cy="307773"/>
+          </a:xfrm>
+          <a:prstGeom prst="rect">
+            <a:avLst/>
+          </a:prstGeom>
+          <a:solidFill>
+            <a:srgbClr val="CCCCCC"/>
+          </a:solidFill>
+          <a:ln>
+            <a:noFill/>
+          </a:ln>
+        </p:spPr>
+        <p:style>
+          <a:lnRef idx="2">
+            <a:srgbClr val="4F81BD">
+              <a:shade val="50000"/>
+            </a:srgbClr>
+          </a:lnRef>
+          <a:fillRef idx="1">
+            <a:srgbClr val="4F81BD"/>
+          </a:fillRef>
+          <a:effectRef idx="0">
+            <a:srgbClr val="4F81BD"/>
+          </a:effectRef>
+          <a:fontRef idx="minor">
+            <a:srgbClr val="000000"/>
+          </a:fontRef>
+        </p:style>
+        <p:txBody>
+          <a:bodyPr rtlCol="0" anchor="ctr"/>
+          <a:lstStyle/>
+          <a:p>
+            <a:pPr algn="ctr"/>
+            <a:r>
+              <a:rPr lang="en-US" sz="1300" dirty="0" err="1" smtClean="0">
+                <a:solidFill>
+                  <a:srgbClr val="000000"/>
+                </a:solidFill>
+                <a:latin typeface="SF Display" panose="00000500000000000000" pitchFamily="50" charset="0"/>
+                <a:ea typeface="SF Display" panose="00000500000000000000" pitchFamily="50" charset="0"/>
+                <a:cs typeface="Segoe UI Semibold" pitchFamily="34" charset="0"/>
+              </a:rPr>
+              <a:t>Volver</a:t>
+            </a:r>
+            <a:r>
+              <a:rPr lang="en-US" sz="1300" dirty="0" smtClean="0">
+                <a:solidFill>
+                  <a:srgbClr val="000000"/>
+                </a:solidFill>
+                <a:latin typeface="SF Display" panose="00000500000000000000" pitchFamily="50" charset="0"/>
+                <a:ea typeface="SF Display" panose="00000500000000000000" pitchFamily="50" charset="0"/>
+                <a:cs typeface="Segoe UI Semibold" pitchFamily="34" charset="0"/>
+              </a:rPr>
+              <a:t> al </a:t>
+            </a:r>
+            <a:r>
+              <a:rPr lang="en-US" sz="1300" dirty="0" err="1">
+                <a:latin typeface="SF Display" panose="00000500000000000000" pitchFamily="50" charset="0"/>
+                <a:ea typeface="SF Display" panose="00000500000000000000" pitchFamily="50" charset="0"/>
+                <a:cs typeface="Segoe UI Semibold" pitchFamily="34" charset="0"/>
+              </a:rPr>
+              <a:t>m</a:t>
+            </a:r>
+            <a:r>
+              <a:rPr lang="en-US" sz="1300" dirty="0" err="1" smtClean="0">
+                <a:solidFill>
+                  <a:srgbClr val="000000"/>
+                </a:solidFill>
+                <a:latin typeface="SF Display" panose="00000500000000000000" pitchFamily="50" charset="0"/>
+                <a:ea typeface="SF Display" panose="00000500000000000000" pitchFamily="50" charset="0"/>
+                <a:cs typeface="Segoe UI Semibold" pitchFamily="34" charset="0"/>
+              </a:rPr>
+              <a:t>enú</a:t>
+            </a:r>
+            <a:r>
+              <a:rPr lang="en-US" sz="1300" dirty="0" smtClean="0">
+                <a:solidFill>
+                  <a:srgbClr val="000000"/>
+                </a:solidFill>
+                <a:latin typeface="SF Display" panose="00000500000000000000" pitchFamily="50" charset="0"/>
+                <a:ea typeface="SF Display" panose="00000500000000000000" pitchFamily="50" charset="0"/>
+                <a:cs typeface="Segoe UI Semibold" pitchFamily="34" charset="0"/>
+              </a:rPr>
+              <a:t> principal</a:t>
+            </a:r>
+            <a:endParaRPr lang="en-US" sz="1300" dirty="0">
+              <a:solidFill>
+                <a:srgbClr val="000000"/>
+              </a:solidFill>
+              <a:latin typeface="SF Display" panose="00000500000000000000" pitchFamily="50" charset="0"/>
+              <a:ea typeface="SF Display" panose="00000500000000000000" pitchFamily="50" charset="0"/>
+              <a:cs typeface="Segoe UI Semibold" pitchFamily="34" charset="0"/>
+            </a:endParaRPr>
+          </a:p>
+        </p:txBody>
+      </p:sp>
+      <p:sp>
+        <p:nvSpPr>
+          <p:cNvPr id="60" name="Content"/>
+          <p:cNvSpPr/>
+          <p:nvPr>
+            <p:custDataLst>
+              <p:custData r:id="rId23"/>
+            </p:custDataLst>
+          </p:nvPr>
+        </p:nvSpPr>
+        <p:spPr>
+          <a:xfrm>
+            <a:off x="7993268" y="4989886"/>
+            <a:ext cx="1696212" cy="307773"/>
+          </a:xfrm>
+          <a:prstGeom prst="rect">
+            <a:avLst/>
+          </a:prstGeom>
+          <a:solidFill>
+            <a:srgbClr val="CCCCCC"/>
+          </a:solidFill>
+          <a:ln>
+            <a:noFill/>
+          </a:ln>
+        </p:spPr>
+        <p:style>
+          <a:lnRef idx="2">
+            <a:srgbClr val="4F81BD">
+              <a:shade val="50000"/>
+            </a:srgbClr>
+          </a:lnRef>
+          <a:fillRef idx="1">
+            <a:srgbClr val="4F81BD"/>
+          </a:fillRef>
+          <a:effectRef idx="0">
+            <a:srgbClr val="4F81BD"/>
+          </a:effectRef>
+          <a:fontRef idx="minor">
+            <a:srgbClr val="000000"/>
+          </a:fontRef>
+        </p:style>
+        <p:txBody>
+          <a:bodyPr rtlCol="0" anchor="ctr"/>
+          <a:lstStyle/>
+          <a:p>
+            <a:pPr algn="ctr"/>
+            <a:r>
+              <a:rPr lang="en-US" sz="1300" dirty="0" err="1" smtClean="0">
+                <a:solidFill>
+                  <a:srgbClr val="000000"/>
+                </a:solidFill>
+                <a:latin typeface="SF Display" panose="00000500000000000000" pitchFamily="50" charset="0"/>
+                <a:ea typeface="SF Display" panose="00000500000000000000" pitchFamily="50" charset="0"/>
+                <a:cs typeface="Segoe UI Semibold" pitchFamily="34" charset="0"/>
+              </a:rPr>
+              <a:t>Volver</a:t>
+            </a:r>
+            <a:r>
+              <a:rPr lang="en-US" sz="1300" dirty="0" smtClean="0">
+                <a:solidFill>
+                  <a:srgbClr val="000000"/>
+                </a:solidFill>
+                <a:latin typeface="SF Display" panose="00000500000000000000" pitchFamily="50" charset="0"/>
+                <a:ea typeface="SF Display" panose="00000500000000000000" pitchFamily="50" charset="0"/>
+                <a:cs typeface="Segoe UI Semibold" pitchFamily="34" charset="0"/>
+              </a:rPr>
+              <a:t> al </a:t>
+            </a:r>
+            <a:r>
+              <a:rPr lang="en-US" sz="1300" dirty="0" err="1">
+                <a:latin typeface="SF Display" panose="00000500000000000000" pitchFamily="50" charset="0"/>
+                <a:ea typeface="SF Display" panose="00000500000000000000" pitchFamily="50" charset="0"/>
+                <a:cs typeface="Segoe UI Semibold" pitchFamily="34" charset="0"/>
+              </a:rPr>
+              <a:t>m</a:t>
+            </a:r>
+            <a:r>
+              <a:rPr lang="en-US" sz="1300" dirty="0" err="1" smtClean="0">
+                <a:solidFill>
+                  <a:srgbClr val="000000"/>
+                </a:solidFill>
+                <a:latin typeface="SF Display" panose="00000500000000000000" pitchFamily="50" charset="0"/>
+                <a:ea typeface="SF Display" panose="00000500000000000000" pitchFamily="50" charset="0"/>
+                <a:cs typeface="Segoe UI Semibold" pitchFamily="34" charset="0"/>
+              </a:rPr>
+              <a:t>enú</a:t>
+            </a:r>
+            <a:r>
+              <a:rPr lang="en-US" sz="1300" dirty="0" smtClean="0">
+                <a:solidFill>
+                  <a:srgbClr val="000000"/>
+                </a:solidFill>
+                <a:latin typeface="SF Display" panose="00000500000000000000" pitchFamily="50" charset="0"/>
+                <a:ea typeface="SF Display" panose="00000500000000000000" pitchFamily="50" charset="0"/>
+                <a:cs typeface="Segoe UI Semibold" pitchFamily="34" charset="0"/>
+              </a:rPr>
+              <a:t> principal</a:t>
+            </a:r>
+            <a:endParaRPr lang="en-US" sz="1300" dirty="0">
+              <a:solidFill>
+                <a:srgbClr val="000000"/>
+              </a:solidFill>
+              <a:latin typeface="SF Display" panose="00000500000000000000" pitchFamily="50" charset="0"/>
+              <a:ea typeface="SF Display" panose="00000500000000000000" pitchFamily="50" charset="0"/>
+              <a:cs typeface="Segoe UI Semibold" pitchFamily="34" charset="0"/>
+            </a:endParaRPr>
+          </a:p>
+        </p:txBody>
+      </p:sp>
+      <p:grpSp>
+        <p:nvGrpSpPr>
+          <p:cNvPr id="61" name="Callout"/>
+          <p:cNvGrpSpPr/>
+          <p:nvPr>
+            <p:custDataLst>
+              <p:custData r:id="rId24"/>
+            </p:custDataLst>
+          </p:nvPr>
+        </p:nvGrpSpPr>
+        <p:grpSpPr>
+          <a:xfrm>
+            <a:off x="4008986" y="4860545"/>
+            <a:ext cx="320451" cy="319476"/>
+            <a:chOff x="4283964" y="3147930"/>
+            <a:chExt cx="320451" cy="319476"/>
+          </a:xfrm>
+        </p:grpSpPr>
+        <p:sp>
+          <p:nvSpPr>
+            <p:cNvPr id="62" name="Circle"/>
+            <p:cNvSpPr/>
+            <p:nvPr>
+              <p:custDataLst>
+                <p:custData r:id="rId27"/>
+              </p:custDataLst>
+            </p:nvPr>
+          </p:nvSpPr>
+          <p:spPr>
+            <a:xfrm>
+              <a:off x="4283964" y="3147930"/>
+              <a:ext cx="320451" cy="319476"/>
+            </a:xfrm>
+            <a:prstGeom prst="ellipse">
+              <a:avLst/>
+            </a:prstGeom>
+            <a:solidFill>
+              <a:srgbClr val="FFFF00"/>
+            </a:solidFill>
+            <a:ln w="38100" cap="flat" cmpd="sng" algn="ctr">
+              <a:solidFill>
+                <a:srgbClr val="FFFFFF">
+                  <a:lumMod val="50000"/>
+                </a:srgbClr>
+              </a:solidFill>
+              <a:prstDash val="solid"/>
+            </a:ln>
+            <a:effectLst/>
+          </p:spPr>
+          <p:txBody>
+            <a:bodyPr rot="0" spcFirstLastPara="0" vertOverflow="overflow" horzOverflow="overflow" vert="horz" wrap="square" lIns="45720" tIns="45720" rIns="91440" bIns="45720" numCol="1" spcCol="0" rtlCol="0" fromWordArt="0" anchor="ctr" anchorCtr="0" forceAA="0" compatLnSpc="1">
+              <a:prstTxWarp prst="textNoShape">
+                <a:avLst/>
+              </a:prstTxWarp>
+              <a:noAutofit/>
+            </a:bodyPr>
+            <a:lstStyle/>
+            <a:p>
+              <a:pPr marL="0" marR="0" indent="0" algn="ctr" defTabSz="914400" eaLnBrk="1" fontAlgn="auto" latinLnBrk="0" hangingPunct="1">
+                <a:lnSpc>
+                  <a:spcPct val="100000"/>
+                </a:lnSpc>
+                <a:spcBef>
+                  <a:spcPts val="0"/>
+                </a:spcBef>
+                <a:spcAft>
+                  <a:spcPts val="0"/>
+                </a:spcAft>
+                <a:buClrTx/>
+                <a:buSzTx/>
+                <a:buFontTx/>
+                <a:buNone/>
+                <a:tabLst/>
+              </a:pPr>
+              <a:endParaRPr kumimoji="0" lang="en-US" sz="800" b="0" i="0" u="none" strike="noStrike" kern="0" cap="none" spc="0" normalizeH="0" baseline="0" noProof="0" dirty="0" smtClean="0">
+                <a:ln>
+                  <a:noFill/>
+                </a:ln>
+                <a:solidFill>
+                  <a:srgbClr val="000000">
+                    <a:lumMod val="75000"/>
+                    <a:lumOff val="25000"/>
+                  </a:srgbClr>
+                </a:solidFill>
+                <a:effectLst/>
+                <a:uLnTx/>
+                <a:uFillTx/>
+                <a:latin typeface="Segoe UI"/>
+                <a:ea typeface="+mn-ea"/>
+                <a:cs typeface="+mn-cs"/>
+              </a:endParaRPr>
+            </a:p>
+          </p:txBody>
+        </p:sp>
+        <p:sp>
+          <p:nvSpPr>
+            <p:cNvPr id="63" name="Content"/>
+            <p:cNvSpPr txBox="1"/>
+            <p:nvPr/>
+          </p:nvSpPr>
+          <p:spPr>
+            <a:xfrm flipH="1">
+              <a:off x="4309771" y="3157455"/>
+              <a:ext cx="268835" cy="276999"/>
+            </a:xfrm>
+            <a:prstGeom prst="rect">
+              <a:avLst/>
+            </a:prstGeom>
+            <a:noFill/>
+          </p:spPr>
+          <p:txBody>
+            <a:bodyPr wrap="square" rtlCol="0">
+              <a:spAutoFit/>
+            </a:bodyPr>
+            <a:lstStyle/>
+            <a:p>
+              <a:r>
+                <a:rPr lang="en-US" sz="1200" dirty="0" smtClean="0"/>
+                <a:t>1</a:t>
+              </a:r>
+              <a:endParaRPr lang="en-US" sz="1200" dirty="0"/>
+            </a:p>
+          </p:txBody>
+        </p:sp>
+      </p:grpSp>
+      <p:grpSp>
+        <p:nvGrpSpPr>
+          <p:cNvPr id="64" name="Callout"/>
+          <p:cNvGrpSpPr/>
+          <p:nvPr>
+            <p:custDataLst>
+              <p:custData r:id="rId25"/>
+            </p:custDataLst>
+          </p:nvPr>
+        </p:nvGrpSpPr>
+        <p:grpSpPr>
+          <a:xfrm>
+            <a:off x="9474809" y="4902406"/>
+            <a:ext cx="320451" cy="319476"/>
+            <a:chOff x="4283964" y="3147930"/>
+            <a:chExt cx="320451" cy="319476"/>
+          </a:xfrm>
+        </p:grpSpPr>
+        <p:sp>
+          <p:nvSpPr>
+            <p:cNvPr id="65" name="Circle"/>
+            <p:cNvSpPr/>
+            <p:nvPr>
+              <p:custDataLst>
+                <p:custData r:id="rId26"/>
+              </p:custDataLst>
+            </p:nvPr>
+          </p:nvSpPr>
+          <p:spPr>
+            <a:xfrm>
+              <a:off x="4283964" y="3147930"/>
+              <a:ext cx="320451" cy="319476"/>
+            </a:xfrm>
+            <a:prstGeom prst="ellipse">
+              <a:avLst/>
+            </a:prstGeom>
+            <a:solidFill>
+              <a:srgbClr val="FFFF00"/>
+            </a:solidFill>
+            <a:ln w="38100" cap="flat" cmpd="sng" algn="ctr">
+              <a:solidFill>
+                <a:srgbClr val="FFFFFF">
+                  <a:lumMod val="50000"/>
+                </a:srgbClr>
+              </a:solidFill>
+              <a:prstDash val="solid"/>
+            </a:ln>
+            <a:effectLst/>
+          </p:spPr>
+          <p:txBody>
+            <a:bodyPr rot="0" spcFirstLastPara="0" vertOverflow="overflow" horzOverflow="overflow" vert="horz" wrap="square" lIns="45720" tIns="45720" rIns="91440" bIns="45720" numCol="1" spcCol="0" rtlCol="0" fromWordArt="0" anchor="ctr" anchorCtr="0" forceAA="0" compatLnSpc="1">
+              <a:prstTxWarp prst="textNoShape">
+                <a:avLst/>
+              </a:prstTxWarp>
+              <a:noAutofit/>
+            </a:bodyPr>
+            <a:lstStyle/>
+            <a:p>
+              <a:pPr marL="0" marR="0" indent="0" algn="ctr" defTabSz="914400" eaLnBrk="1" fontAlgn="auto" latinLnBrk="0" hangingPunct="1">
+                <a:lnSpc>
+                  <a:spcPct val="100000"/>
+                </a:lnSpc>
+                <a:spcBef>
+                  <a:spcPts val="0"/>
+                </a:spcBef>
+                <a:spcAft>
+                  <a:spcPts val="0"/>
+                </a:spcAft>
+                <a:buClrTx/>
+                <a:buSzTx/>
+                <a:buFontTx/>
+                <a:buNone/>
+                <a:tabLst/>
+              </a:pPr>
+              <a:endParaRPr kumimoji="0" lang="en-US" sz="800" b="0" i="0" u="none" strike="noStrike" kern="0" cap="none" spc="0" normalizeH="0" baseline="0" noProof="0" dirty="0" smtClean="0">
+                <a:ln>
+                  <a:noFill/>
+                </a:ln>
+                <a:solidFill>
+                  <a:srgbClr val="000000">
+                    <a:lumMod val="75000"/>
+                    <a:lumOff val="25000"/>
+                  </a:srgbClr>
+                </a:solidFill>
+                <a:effectLst/>
+                <a:uLnTx/>
+                <a:uFillTx/>
+                <a:latin typeface="Segoe UI"/>
+                <a:ea typeface="+mn-ea"/>
+                <a:cs typeface="+mn-cs"/>
+              </a:endParaRPr>
+            </a:p>
+          </p:txBody>
+        </p:sp>
+        <p:sp>
+          <p:nvSpPr>
+            <p:cNvPr id="66" name="Content"/>
             <p:cNvSpPr txBox="1"/>
             <p:nvPr/>
           </p:nvSpPr>
@@ -9298,10 +9802,6 @@
               </a:rPr>
               <a:t>2</a:t>
             </a:r>
-            <a:endParaRPr lang="es-ES" sz="2800" dirty="0">
-              <a:latin typeface="SF Text" panose="00000500000000000000" pitchFamily="50" charset="0"/>
-              <a:ea typeface="SF Text" panose="00000500000000000000" pitchFamily="50" charset="0"/>
-            </a:endParaRPr>
           </a:p>
         </p:txBody>
       </p:sp>
@@ -9487,14 +9987,7 @@
                 <a:latin typeface="SF Display" panose="00000500000000000000" pitchFamily="50" charset="0"/>
                 <a:ea typeface="SF Display" panose="00000500000000000000" pitchFamily="50" charset="0"/>
               </a:rPr>
-              <a:t> </a:t>
-            </a:r>
-            <a:r>
-              <a:rPr lang="en-US" dirty="0" smtClean="0">
-                <a:latin typeface="SF Display" panose="00000500000000000000" pitchFamily="50" charset="0"/>
-                <a:ea typeface="SF Display" panose="00000500000000000000" pitchFamily="50" charset="0"/>
-              </a:rPr>
-              <a:t>#1</a:t>
+              <a:t> #1</a:t>
             </a:r>
             <a:endParaRPr lang="en-US" dirty="0">
               <a:latin typeface="SF Display" panose="00000500000000000000" pitchFamily="50" charset="0"/>
@@ -10052,25 +10545,25 @@
 
 <file path=customXml/item1.xml><?xml version="1.0" encoding="utf-8"?>
 <Control xmlns="http://schemas.microsoft.com/VisualStudio/2011/storyboarding/control">
-  <Id Name="System.Storyboarding.Backgrounds.WindowsPhone" Revision="1" Stencil="System.Storyboarding.Backgrounds" StencilVersion="0.1"/>
+  <Id Name="System.Storyboarding.Annotation.CallOut" Revision="1" Stencil="System.Storyboarding.Annotation" StencilVersion="0.1"/>
 </Control>
 </file>
 
 <file path=customXml/item10.xml><?xml version="1.0" encoding="utf-8"?>
+<Control xmlns="http://schemas.microsoft.com/VisualStudio/2011/storyboarding/control">
+  <Id Name="System.Storyboarding.WindowsApps.WindowsAppsTileMedium" Revision="1" Stencil="System.Storyboarding.WindowsApps" StencilVersion="0.1"/>
+</Control>
+</file>
+
+<file path=customXml/item11.xml><?xml version="1.0" encoding="utf-8"?>
 <Control xmlns="http://schemas.microsoft.com/VisualStudio/2011/storyboarding/control">
   <Id Name="System.Storyboarding.Annotation.CallOut" Revision="1" Stencil="System.Storyboarding.Annotation" StencilVersion="0.1"/>
 </Control>
 </file>
 
-<file path=customXml/item11.xml><?xml version="1.0" encoding="utf-8"?>
-<Control xmlns="http://schemas.microsoft.com/VisualStudio/2011/storyboarding/control">
-  <Id Name="fd7d7bed-114e-464c-a4f1-01a512005949" Revision="1" Stencil="System.MyShapes" StencilVersion="1.0"/>
-</Control>
-</file>
-
 <file path=customXml/item12.xml><?xml version="1.0" encoding="utf-8"?>
 <Control xmlns="http://schemas.microsoft.com/VisualStudio/2011/storyboarding/control">
-  <Id Name="System.Storyboarding.WindowsAppIcons.Games" Revision="1" Stencil="System.Storyboarding.WindowsAppIcons" StencilVersion="0.1"/>
+  <Id Name="System.Storyboarding.WindowsApps.WindowsAppsButton" Revision="1" Stencil="System.Storyboarding.WindowsApps" StencilVersion="0.1"/>
 </Control>
 </file>
 
@@ -10088,31 +10581,31 @@
 
 <file path=customXml/item15.xml><?xml version="1.0" encoding="utf-8"?>
 <Control xmlns="http://schemas.microsoft.com/VisualStudio/2011/storyboarding/control">
-  <Id Name="System.Storyboarding.WindowsApps.WindowsAppsButton" Revision="1" Stencil="System.Storyboarding.WindowsApps" StencilVersion="0.1"/>
+  <Id Name="System.Storyboarding.WindowsApps.WindowsAppsTileMedium" Revision="1" Stencil="System.Storyboarding.WindowsApps" StencilVersion="0.1"/>
 </Control>
 </file>
 
 <file path=customXml/item16.xml><?xml version="1.0" encoding="utf-8"?>
 <Control xmlns="http://schemas.microsoft.com/VisualStudio/2011/storyboarding/control">
-  <Id Name="System.Storyboarding.WindowsApps.WindowsAppsButton" Revision="1" Stencil="System.Storyboarding.WindowsApps" StencilVersion="0.1"/>
+  <Id Name="fd7d7bed-114e-464c-a4f1-01a512005949" Revision="1" Stencil="System.MyShapes" StencilVersion="1.0"/>
 </Control>
 </file>
 
 <file path=customXml/item17.xml><?xml version="1.0" encoding="utf-8"?>
 <Control xmlns="http://schemas.microsoft.com/VisualStudio/2011/storyboarding/control">
-  <Id Name="System.Storyboarding.WindowsApps.WindowsAppsButton" Revision="1" Stencil="System.Storyboarding.WindowsApps" StencilVersion="0.1"/>
+  <Id Name="System.Storyboarding.Annotation.CallOut" Revision="1" Stencil="System.Storyboarding.Annotation" StencilVersion="0.1"/>
 </Control>
 </file>
 
 <file path=customXml/item18.xml><?xml version="1.0" encoding="utf-8"?>
 <Control xmlns="http://schemas.microsoft.com/VisualStudio/2011/storyboarding/control">
-  <Id Name="System.Storyboarding.WindowsApps.WindowsAppsButton" Revision="1" Stencil="System.Storyboarding.WindowsApps" StencilVersion="0.1"/>
+  <Id Name="System.Storyboarding.WindowsApps.WindowsAppsTileMedium" Revision="1" Stencil="System.Storyboarding.WindowsApps" StencilVersion="0.1"/>
 </Control>
 </file>
 
 <file path=customXml/item19.xml><?xml version="1.0" encoding="utf-8"?>
 <Control xmlns="http://schemas.microsoft.com/VisualStudio/2011/storyboarding/control">
-  <Id Name="System.Storyboarding.WindowsApps.WindowsAppsTileMedium" Revision="1" Stencil="System.Storyboarding.WindowsApps" StencilVersion="0.1"/>
+  <Id Name="System.Storyboarding.WindowsAppIcons.Emoji" Revision="1" Stencil="System.Storyboarding.WindowsAppIcons" StencilVersion="0.1"/>
 </Control>
 </file>
 
@@ -10124,19 +10617,19 @@
 
 <file path=customXml/item20.xml><?xml version="1.0" encoding="utf-8"?>
 <Control xmlns="http://schemas.microsoft.com/VisualStudio/2011/storyboarding/control">
-  <Id Name="System.Storyboarding.Backgrounds.WindowsPhone" Revision="1" Stencil="System.Storyboarding.Backgrounds" StencilVersion="0.1"/>
+  <Id Name="System.Storyboarding.WindowsApps.WindowsAppsButton" Revision="1" Stencil="System.Storyboarding.WindowsApps" StencilVersion="0.1"/>
 </Control>
 </file>
 
 <file path=customXml/item21.xml><?xml version="1.0" encoding="utf-8"?>
 <Control xmlns="http://schemas.microsoft.com/VisualStudio/2011/storyboarding/control">
-  <Id Name="System.Storyboarding.WindowsApps.WindowsAppsButton" Revision="1" Stencil="System.Storyboarding.WindowsApps" StencilVersion="0.1"/>
+  <Id Name="fd7d7bed-114e-464c-a4f1-01a512005949" Revision="1" Stencil="System.MyShapes" StencilVersion="1.0"/>
 </Control>
 </file>
 
 <file path=customXml/item22.xml><?xml version="1.0" encoding="utf-8"?>
 <Control xmlns="http://schemas.microsoft.com/VisualStudio/2011/storyboarding/control">
-  <Id Name="System.Storyboarding.WindowsApps.WindowsAppsTileMedium" Revision="1" Stencil="System.Storyboarding.WindowsApps" StencilVersion="0.1"/>
+  <Id Name="System.Storyboarding.Annotation.CallOut" Revision="1" Stencil="System.Storyboarding.Annotation" StencilVersion="0.1"/>
 </Control>
 </file>
 
@@ -10148,25 +10641,25 @@
 
 <file path=customXml/item24.xml><?xml version="1.0" encoding="utf-8"?>
 <Control xmlns="http://schemas.microsoft.com/VisualStudio/2011/storyboarding/control">
+  <Id Name="System.Storyboarding.WindowsAppIcons.Games" Revision="1" Stencil="System.Storyboarding.WindowsAppIcons" StencilVersion="0.1"/>
+</Control>
+</file>
+
+<file path=customXml/item25.xml><?xml version="1.0" encoding="utf-8"?>
+<Control xmlns="http://schemas.microsoft.com/VisualStudio/2011/storyboarding/control">
   <Id Name="System.Storyboarding.WindowsApps.WindowsAppsButton" Revision="1" Stencil="System.Storyboarding.WindowsApps" StencilVersion="0.1"/>
 </Control>
 </file>
 
-<file path=customXml/item25.xml><?xml version="1.0" encoding="utf-8"?>
+<file path=customXml/item26.xml><?xml version="1.0" encoding="utf-8"?>
 <Control xmlns="http://schemas.microsoft.com/VisualStudio/2011/storyboarding/control">
   <Id Name="System.Storyboarding.Backgrounds.WindowsPhone" Revision="1" Stencil="System.Storyboarding.Backgrounds" StencilVersion="0.1"/>
 </Control>
 </file>
 
-<file path=customXml/item26.xml><?xml version="1.0" encoding="utf-8"?>
-<Control xmlns="http://schemas.microsoft.com/VisualStudio/2011/storyboarding/control">
-  <Id Name="System.Storyboarding.WindowsApps.WindowsAppsTileMedium" Revision="1" Stencil="System.Storyboarding.WindowsApps" StencilVersion="0.1"/>
-</Control>
-</file>
-
 <file path=customXml/item27.xml><?xml version="1.0" encoding="utf-8"?>
 <Control xmlns="http://schemas.microsoft.com/VisualStudio/2011/storyboarding/control">
-  <Id Name="fd7d7bed-114e-464c-a4f1-01a512005949" Revision="1" Stencil="System.MyShapes" StencilVersion="1.0"/>
+  <Id Name="System.Storyboarding.WindowsAppIcons.Donotwant" Revision="1" Stencil="System.Storyboarding.WindowsAppIcons" StencilVersion="0.1"/>
 </Control>
 </file>
 
@@ -10178,43 +10671,43 @@
 
 <file path=customXml/item29.xml><?xml version="1.0" encoding="utf-8"?>
 <Control xmlns="http://schemas.microsoft.com/VisualStudio/2011/storyboarding/control">
-  <Id Name="fd7d7bed-114e-464c-a4f1-01a512005949" Revision="1" Stencil="System.MyShapes" StencilVersion="1.0"/>
+  <Id Name="System.Storyboarding.WindowsApps.WindowsAppsTileMedium" Revision="1" Stencil="System.Storyboarding.WindowsApps" StencilVersion="0.1"/>
 </Control>
 </file>
 
 <file path=customXml/item3.xml><?xml version="1.0" encoding="utf-8"?>
 <Control xmlns="http://schemas.microsoft.com/VisualStudio/2011/storyboarding/control">
-  <Id Name="System.Storyboarding.WindowsApps.WindowsAppsTileMedium" Revision="1" Stencil="System.Storyboarding.WindowsApps" StencilVersion="0.1"/>
+  <Id Name="System.Storyboarding.WindowsApps.WindowsAppsButton" Revision="1" Stencil="System.Storyboarding.WindowsApps" StencilVersion="0.1"/>
 </Control>
 </file>
 
 <file path=customXml/item30.xml><?xml version="1.0" encoding="utf-8"?>
+<Control xmlns="http://schemas.microsoft.com/VisualStudio/2011/storyboarding/control">
+  <Id Name="System.Storyboarding.Backgrounds.WindowsPhone" Revision="1" Stencil="System.Storyboarding.Backgrounds" StencilVersion="0.1"/>
+</Control>
+</file>
+
+<file path=customXml/item31.xml><?xml version="1.0" encoding="utf-8"?>
 <Control xmlns="http://schemas.microsoft.com/VisualStudio/2011/storyboarding/control">
   <Id Name="System.Storyboarding.Annotation.CallOut" Revision="1" Stencil="System.Storyboarding.Annotation" StencilVersion="0.1"/>
 </Control>
 </file>
 
-<file path=customXml/item31.xml><?xml version="1.0" encoding="utf-8"?>
-<Control xmlns="http://schemas.microsoft.com/VisualStudio/2011/storyboarding/control">
-  <Id Name="System.Storyboarding.WindowsApps.WindowsAppsTileMedium" Revision="1" Stencil="System.Storyboarding.WindowsApps" StencilVersion="0.1"/>
-</Control>
-</file>
-
 <file path=customXml/item32.xml><?xml version="1.0" encoding="utf-8"?>
 <Control xmlns="http://schemas.microsoft.com/VisualStudio/2011/storyboarding/control">
-  <Id Name="System.Storyboarding.WindowsApps.WindowsAppsTileMedium" Revision="1" Stencil="System.Storyboarding.WindowsApps" StencilVersion="0.1"/>
+  <Id Name="System.Storyboarding.Backgrounds.WindowsPhone" Revision="1" Stencil="System.Storyboarding.Backgrounds" StencilVersion="0.1"/>
 </Control>
 </file>
 
 <file path=customXml/item33.xml><?xml version="1.0" encoding="utf-8"?>
 <Control xmlns="http://schemas.microsoft.com/VisualStudio/2011/storyboarding/control">
-  <Id Name="System.Storyboarding.WindowsAppIcons.Donotwant" Revision="1" Stencil="System.Storyboarding.WindowsAppIcons" StencilVersion="0.1"/>
+  <Id Name="fd7d7bed-114e-464c-a4f1-01a512005949" Revision="1" Stencil="System.MyShapes" StencilVersion="1.0"/>
 </Control>
 </file>
 
 <file path=customXml/item34.xml><?xml version="1.0" encoding="utf-8"?>
 <Control xmlns="http://schemas.microsoft.com/VisualStudio/2011/storyboarding/control">
-  <Id Name="System.Storyboarding.WindowsApps.WindowsAppsTileMedium" Revision="1" Stencil="System.Storyboarding.WindowsApps" StencilVersion="0.1"/>
+  <Id Name="System.Storyboarding.WindowsApps.WindowsAppsButton" Revision="1" Stencil="System.Storyboarding.WindowsApps" StencilVersion="0.1"/>
 </Control>
 </file>
 
@@ -10226,61 +10719,61 @@
 
 <file path=customXml/item36.xml><?xml version="1.0" encoding="utf-8"?>
 <Control xmlns="http://schemas.microsoft.com/VisualStudio/2011/storyboarding/control">
+  <Id Name="System.Storyboarding.Annotation.CallOut" Revision="1" Stencil="System.Storyboarding.Annotation" StencilVersion="0.1"/>
+</Control>
+</file>
+
+<file path=customXml/item37.xml><?xml version="1.0" encoding="utf-8"?>
+<Control xmlns="http://schemas.microsoft.com/VisualStudio/2011/storyboarding/control">
   <Id Name="System.Storyboarding.WindowsApps.WindowsAppsButton" Revision="1" Stencil="System.Storyboarding.WindowsApps" StencilVersion="0.1"/>
 </Control>
 </file>
 
-<file path=customXml/item37.xml><?xml version="1.0" encoding="utf-8"?>
+<file path=customXml/item38.xml><?xml version="1.0" encoding="utf-8"?>
+<Control xmlns="http://schemas.microsoft.com/VisualStudio/2011/storyboarding/control">
+  <Id Name="System.Storyboarding.WindowsApps.WindowsAppsButton" Revision="1" Stencil="System.Storyboarding.WindowsApps" StencilVersion="0.1"/>
+</Control>
+</file>
+
+<file path=customXml/item39.xml><?xml version="1.0" encoding="utf-8"?>
+<Control xmlns="http://schemas.microsoft.com/VisualStudio/2011/storyboarding/control">
+  <Id Name="System.Storyboarding.Annotation.CallOut" Revision="1" Stencil="System.Storyboarding.Annotation" StencilVersion="0.1"/>
+</Control>
+</file>
+
+<file path=customXml/item4.xml><?xml version="1.0" encoding="utf-8"?>
 <Control xmlns="http://schemas.microsoft.com/VisualStudio/2011/storyboarding/control">
   <Id Name="fd7d7bed-114e-464c-a4f1-01a512005949" Revision="1" Stencil="System.MyShapes" StencilVersion="1.0"/>
 </Control>
 </file>
 
-<file path=customXml/item38.xml><?xml version="1.0" encoding="utf-8"?>
+<file path=customXml/item40.xml><?xml version="1.0" encoding="utf-8"?>
 <Control xmlns="http://schemas.microsoft.com/VisualStudio/2011/storyboarding/control">
-  <Id Name="System.Storyboarding.Annotation.CallOut" Revision="1" Stencil="System.Storyboarding.Annotation" StencilVersion="0.1"/>
+  <Id Name="System.Storyboarding.WindowsApps.WindowsAppsTileMedium" Revision="1" Stencil="System.Storyboarding.WindowsApps" StencilVersion="0.1"/>
 </Control>
 </file>
 
-<file path=customXml/item39.xml><?xml version="1.0" encoding="utf-8"?>
+<file path=customXml/item41.xml><?xml version="1.0" encoding="utf-8"?>
+<Control xmlns="http://schemas.microsoft.com/VisualStudio/2011/storyboarding/control">
+  <Id Name="System.Storyboarding.WindowsApps.WindowsAppsTileMedium" Revision="1" Stencil="System.Storyboarding.WindowsApps" StencilVersion="0.1"/>
+</Control>
+</file>
+
+<file path=customXml/item42.xml><?xml version="1.0" encoding="utf-8"?>
+<Control xmlns="http://schemas.microsoft.com/VisualStudio/2011/storyboarding/control">
+  <Id Name="fd7d7bed-114e-464c-a4f1-01a512005949" Revision="1" Stencil="System.MyShapes" StencilVersion="1.0"/>
+</Control>
+</file>
+
+<file path=customXml/item43.xml><?xml version="1.0" encoding="utf-8"?>
 <Control xmlns="http://schemas.microsoft.com/VisualStudio/2011/storyboarding/control">
   <Id Name="System.Storyboarding.WindowsApps.WindowsAppsButton" Revision="1" Stencil="System.Storyboarding.WindowsApps" StencilVersion="0.1"/>
 </Control>
 </file>
 
-<file path=customXml/item4.xml><?xml version="1.0" encoding="utf-8"?>
-<Control xmlns="http://schemas.microsoft.com/VisualStudio/2011/storyboarding/control">
-  <Id Name="System.Storyboarding.WindowsApps.WindowsAppsButton" Revision="1" Stencil="System.Storyboarding.WindowsApps" StencilVersion="0.1"/>
-</Control>
-</file>
-
-<file path=customXml/item40.xml><?xml version="1.0" encoding="utf-8"?>
-<Control xmlns="http://schemas.microsoft.com/VisualStudio/2011/storyboarding/control">
-  <Id Name="fd7d7bed-114e-464c-a4f1-01a512005949" Revision="1" Stencil="System.MyShapes" StencilVersion="1.0"/>
-</Control>
-</file>
-
-<file path=customXml/item41.xml><?xml version="1.0" encoding="utf-8"?>
+<file path=customXml/item44.xml><?xml version="1.0" encoding="utf-8"?>
 <Control xmlns="http://schemas.microsoft.com/VisualStudio/2011/storyboarding/control">
   <Id Name="System.Storyboarding.Annotation.CallOut" Revision="1" Stencil="System.Storyboarding.Annotation" StencilVersion="0.1"/>
-</Control>
-</file>
-
-<file path=customXml/item42.xml><?xml version="1.0" encoding="utf-8"?>
-<Control xmlns="http://schemas.microsoft.com/VisualStudio/2011/storyboarding/control">
-  <Id Name="System.Storyboarding.WindowsApps.WindowsAppsTileMedium" Revision="1" Stencil="System.Storyboarding.WindowsApps" StencilVersion="0.1"/>
-</Control>
-</file>
-
-<file path=customXml/item43.xml><?xml version="1.0" encoding="utf-8"?>
-<Control xmlns="http://schemas.microsoft.com/VisualStudio/2011/storyboarding/control">
-  <Id Name="System.Storyboarding.WindowsAppIcons.Emoji" Revision="1" Stencil="System.Storyboarding.WindowsAppIcons" StencilVersion="0.1"/>
-</Control>
-</file>
-
-<file path=customXml/item44.xml><?xml version="1.0" encoding="utf-8"?>
-<Control xmlns="http://schemas.microsoft.com/VisualStudio/2011/storyboarding/control">
-  <Id Name="System.Storyboarding.WindowsApps.WindowsAppsTileMedium" Revision="1" Stencil="System.Storyboarding.WindowsApps" StencilVersion="0.1"/>
 </Control>
 </file>
 
@@ -10292,7 +10785,7 @@
 
 <file path=customXml/item46.xml><?xml version="1.0" encoding="utf-8"?>
 <Control xmlns="http://schemas.microsoft.com/VisualStudio/2011/storyboarding/control">
-  <Id Name="System.Storyboarding.WindowsApps.WindowsAppsTileMedium" Revision="1" Stencil="System.Storyboarding.WindowsApps" StencilVersion="0.1"/>
+  <Id Name="System.Storyboarding.WindowsApps.WindowsAppsButton" Revision="1" Stencil="System.Storyboarding.WindowsApps" StencilVersion="0.1"/>
 </Control>
 </file>
 
@@ -10316,43 +10809,85 @@
 
 <file path=customXml/item5.xml><?xml version="1.0" encoding="utf-8"?>
 <Control xmlns="http://schemas.microsoft.com/VisualStudio/2011/storyboarding/control">
-  <Id Name="System.Storyboarding.WindowsApps.WindowsAppsButton" Revision="1" Stencil="System.Storyboarding.WindowsApps" StencilVersion="0.1"/>
+  <Id Name="fd7d7bed-114e-464c-a4f1-01a512005949" Revision="1" Stencil="System.MyShapes" StencilVersion="1.0"/>
 </Control>
 </file>
 
 <file path=customXml/item50.xml><?xml version="1.0" encoding="utf-8"?>
+<Control xmlns="http://schemas.microsoft.com/VisualStudio/2011/storyboarding/control">
+  <Id Name="System.Storyboarding.WindowsApps.WindowsAppsTileMedium" Revision="1" Stencil="System.Storyboarding.WindowsApps" StencilVersion="0.1"/>
+</Control>
+</file>
+
+<file path=customXml/item51.xml><?xml version="1.0" encoding="utf-8"?>
+<Control xmlns="http://schemas.microsoft.com/VisualStudio/2011/storyboarding/control">
+  <Id Name="System.Storyboarding.WindowsApps.WindowsAppsTileMedium" Revision="1" Stencil="System.Storyboarding.WindowsApps" StencilVersion="0.1"/>
+</Control>
+</file>
+
+<file path=customXml/item52.xml><?xml version="1.0" encoding="utf-8"?>
+<Control xmlns="http://schemas.microsoft.com/VisualStudio/2011/storyboarding/control">
+  <Id Name="System.Storyboarding.WindowsApps.WindowsAppsTileMedium" Revision="1" Stencil="System.Storyboarding.WindowsApps" StencilVersion="0.1"/>
+</Control>
+</file>
+
+<file path=customXml/item53.xml><?xml version="1.0" encoding="utf-8"?>
 <Control xmlns="http://schemas.microsoft.com/VisualStudio/2011/storyboarding/control">
   <Id Name="fd7d7bed-114e-464c-a4f1-01a512005949" Revision="1" Stencil="System.MyShapes" StencilVersion="1.0"/>
 </Control>
 </file>
 
-<file path=customXml/item51.xml><?xml version="1.0" encoding="utf-8"?>
+<file path=customXml/item54.xml><?xml version="1.0" encoding="utf-8"?>
+<Control xmlns="http://schemas.microsoft.com/VisualStudio/2011/storyboarding/control">
+  <Id Name="System.Storyboarding.WindowsApps.WindowsAppsButton" Revision="1" Stencil="System.Storyboarding.WindowsApps" StencilVersion="0.1"/>
+</Control>
+</file>
+
+<file path=customXml/item55.xml><?xml version="1.0" encoding="utf-8"?>
+<Control xmlns="http://schemas.microsoft.com/VisualStudio/2011/storyboarding/control">
+  <Id Name="System.Storyboarding.WindowsApps.WindowsAppsButton" Revision="1" Stencil="System.Storyboarding.WindowsApps" StencilVersion="0.1"/>
+</Control>
+</file>
+
+<file path=customXml/item56.xml><?xml version="1.0" encoding="utf-8"?>
 <Control xmlns="http://schemas.microsoft.com/VisualStudio/2011/storyboarding/control">
   <Id Name="System.Storyboarding.Annotation.CallOut" Revision="1" Stencil="System.Storyboarding.Annotation" StencilVersion="0.1"/>
 </Control>
 </file>
 
-<file path=customXml/item52.xml><?xml version="1.0" encoding="utf-8"?>
+<file path=customXml/item57.xml><?xml version="1.0" encoding="utf-8"?>
 <Control xmlns="http://schemas.microsoft.com/VisualStudio/2011/storyboarding/control">
   <Id Name="fd7d7bed-114e-464c-a4f1-01a512005949" Revision="1" Stencil="System.MyShapes" StencilVersion="1.0"/>
 </Control>
 </file>
 
-<file path=customXml/item53.xml><?xml version="1.0" encoding="utf-8"?>
+<file path=customXml/item58.xml><?xml version="1.0" encoding="utf-8"?>
 <Control xmlns="http://schemas.microsoft.com/VisualStudio/2011/storyboarding/control">
   <Id Name="System.Storyboarding.Annotation.CallOut" Revision="1" Stencil="System.Storyboarding.Annotation" StencilVersion="0.1"/>
 </Control>
 </file>
 
-<file path=customXml/item6.xml><?xml version="1.0" encoding="utf-8"?>
+<file path=customXml/item59.xml><?xml version="1.0" encoding="utf-8"?>
 <Control xmlns="http://schemas.microsoft.com/VisualStudio/2011/storyboarding/control">
   <Id Name="fd7d7bed-114e-464c-a4f1-01a512005949" Revision="1" Stencil="System.MyShapes" StencilVersion="1.0"/>
 </Control>
 </file>
 
+<file path=customXml/item6.xml><?xml version="1.0" encoding="utf-8"?>
+<Control xmlns="http://schemas.microsoft.com/VisualStudio/2011/storyboarding/control">
+  <Id Name="System.Storyboarding.WindowsApps.WindowsAppsButton" Revision="1" Stencil="System.Storyboarding.WindowsApps" StencilVersion="0.1"/>
+</Control>
+</file>
+
+<file path=customXml/item60.xml><?xml version="1.0" encoding="utf-8"?>
+<Control xmlns="http://schemas.microsoft.com/VisualStudio/2011/storyboarding/control">
+  <Id Name="System.Storyboarding.Icons.Error" Revision="1" Stencil="System.Storyboarding.Icons" StencilVersion="0.1"/>
+</Control>
+</file>
+
 <file path=customXml/item7.xml><?xml version="1.0" encoding="utf-8"?>
 <Control xmlns="http://schemas.microsoft.com/VisualStudio/2011/storyboarding/control">
-  <Id Name="System.Storyboarding.Annotation.CallOut" Revision="1" Stencil="System.Storyboarding.Annotation" StencilVersion="0.1"/>
+  <Id Name="System.Storyboarding.WindowsApps.WindowsAppsTileMedium" Revision="1" Stencil="System.Storyboarding.WindowsApps" StencilVersion="0.1"/>
 </Control>
 </file>
 
@@ -10364,12 +10899,12 @@
 
 <file path=customXml/item9.xml><?xml version="1.0" encoding="utf-8"?>
 <Control xmlns="http://schemas.microsoft.com/VisualStudio/2011/storyboarding/control">
-  <Id Name="System.Storyboarding.Annotation.CallOut" Revision="1" Stencil="System.Storyboarding.Annotation" StencilVersion="0.1"/>
+  <Id Name="fd7d7bed-114e-464c-a4f1-01a512005949" Revision="1" Stencil="System.MyShapes" StencilVersion="1.0"/>
 </Control>
 </file>
 
 <file path=customXml/itemProps1.xml><?xml version="1.0" encoding="utf-8"?>
-<ds:datastoreItem xmlns:ds="http://schemas.openxmlformats.org/officeDocument/2006/customXml" ds:itemID="{831CC1F3-48E3-4367-AA27-BFB6D7A37182}">
+<ds:datastoreItem xmlns:ds="http://schemas.openxmlformats.org/officeDocument/2006/customXml" ds:itemID="{190EBEF0-CB9E-4C67-BBD3-192F9F5BB87E}">
   <ds:schemaRefs>
     <ds:schemaRef ds:uri="http://schemas.microsoft.com/VisualStudio/2011/storyboarding/control"/>
   </ds:schemaRefs>
@@ -10377,7 +10912,7 @@
 </file>
 
 <file path=customXml/itemProps10.xml><?xml version="1.0" encoding="utf-8"?>
-<ds:datastoreItem xmlns:ds="http://schemas.openxmlformats.org/officeDocument/2006/customXml" ds:itemID="{C76B3611-00D2-4D8A-81E2-3DAAC702EE04}">
+<ds:datastoreItem xmlns:ds="http://schemas.openxmlformats.org/officeDocument/2006/customXml" ds:itemID="{36EDA764-43F5-4C83-A43C-7C11C84EB100}">
   <ds:schemaRefs>
     <ds:schemaRef ds:uri="http://schemas.microsoft.com/VisualStudio/2011/storyboarding/control"/>
   </ds:schemaRefs>
@@ -10385,7 +10920,7 @@
 </file>
 
 <file path=customXml/itemProps11.xml><?xml version="1.0" encoding="utf-8"?>
-<ds:datastoreItem xmlns:ds="http://schemas.openxmlformats.org/officeDocument/2006/customXml" ds:itemID="{6C142DB8-4046-4E2F-87C2-7EBCDA60703A}">
+<ds:datastoreItem xmlns:ds="http://schemas.openxmlformats.org/officeDocument/2006/customXml" ds:itemID="{571678DC-267F-47C2-A3B2-F591F73394A5}">
   <ds:schemaRefs>
     <ds:schemaRef ds:uri="http://schemas.microsoft.com/VisualStudio/2011/storyboarding/control"/>
   </ds:schemaRefs>
@@ -10393,7 +10928,7 @@
 </file>
 
 <file path=customXml/itemProps12.xml><?xml version="1.0" encoding="utf-8"?>
-<ds:datastoreItem xmlns:ds="http://schemas.openxmlformats.org/officeDocument/2006/customXml" ds:itemID="{5DDEC329-F8A0-4AB7-A43D-EBCA2E0A9F0A}">
+<ds:datastoreItem xmlns:ds="http://schemas.openxmlformats.org/officeDocument/2006/customXml" ds:itemID="{FEEE37C0-7C52-4B75-B817-78E5E594B56F}">
   <ds:schemaRefs>
     <ds:schemaRef ds:uri="http://schemas.microsoft.com/VisualStudio/2011/storyboarding/control"/>
   </ds:schemaRefs>
@@ -10401,7 +10936,7 @@
 </file>
 
 <file path=customXml/itemProps13.xml><?xml version="1.0" encoding="utf-8"?>
-<ds:datastoreItem xmlns:ds="http://schemas.openxmlformats.org/officeDocument/2006/customXml" ds:itemID="{DE293149-9CCD-457B-84DE-7E7B56E1FEFC}">
+<ds:datastoreItem xmlns:ds="http://schemas.openxmlformats.org/officeDocument/2006/customXml" ds:itemID="{55094CDB-2A74-4FBE-902E-908BB32F232D}">
   <ds:schemaRefs>
     <ds:schemaRef ds:uri="http://schemas.microsoft.com/VisualStudio/2011/storyboarding/control"/>
   </ds:schemaRefs>
@@ -10417,7 +10952,7 @@
 </file>
 
 <file path=customXml/itemProps15.xml><?xml version="1.0" encoding="utf-8"?>
-<ds:datastoreItem xmlns:ds="http://schemas.openxmlformats.org/officeDocument/2006/customXml" ds:itemID="{C81C1EAF-5573-4252-ABC3-FCE2BB949409}">
+<ds:datastoreItem xmlns:ds="http://schemas.openxmlformats.org/officeDocument/2006/customXml" ds:itemID="{004B09A5-32AD-4CCB-8361-A2EF01A5A068}">
   <ds:schemaRefs>
     <ds:schemaRef ds:uri="http://schemas.microsoft.com/VisualStudio/2011/storyboarding/control"/>
   </ds:schemaRefs>
@@ -10425,7 +10960,7 @@
 </file>
 
 <file path=customXml/itemProps16.xml><?xml version="1.0" encoding="utf-8"?>
-<ds:datastoreItem xmlns:ds="http://schemas.openxmlformats.org/officeDocument/2006/customXml" ds:itemID="{D3B48954-D3FD-48DF-BABD-6FC53C1FE557}">
+<ds:datastoreItem xmlns:ds="http://schemas.openxmlformats.org/officeDocument/2006/customXml" ds:itemID="{59EA028F-946B-4A71-BD84-489D2C1341A2}">
   <ds:schemaRefs>
     <ds:schemaRef ds:uri="http://schemas.microsoft.com/VisualStudio/2011/storyboarding/control"/>
   </ds:schemaRefs>
@@ -10433,7 +10968,7 @@
 </file>
 
 <file path=customXml/itemProps17.xml><?xml version="1.0" encoding="utf-8"?>
-<ds:datastoreItem xmlns:ds="http://schemas.openxmlformats.org/officeDocument/2006/customXml" ds:itemID="{3F793D20-BE72-4C4B-9D26-502AA3F72ECF}">
+<ds:datastoreItem xmlns:ds="http://schemas.openxmlformats.org/officeDocument/2006/customXml" ds:itemID="{0F67BC1B-C4A3-4EF8-B37F-FD887C9E8AEC}">
   <ds:schemaRefs>
     <ds:schemaRef ds:uri="http://schemas.microsoft.com/VisualStudio/2011/storyboarding/control"/>
   </ds:schemaRefs>
@@ -10441,7 +10976,7 @@
 </file>
 
 <file path=customXml/itemProps18.xml><?xml version="1.0" encoding="utf-8"?>
-<ds:datastoreItem xmlns:ds="http://schemas.openxmlformats.org/officeDocument/2006/customXml" ds:itemID="{F3D1B56C-1098-4BDA-B23F-5C6F926B691C}">
+<ds:datastoreItem xmlns:ds="http://schemas.openxmlformats.org/officeDocument/2006/customXml" ds:itemID="{9483A2CD-33FC-48E4-A7B5-B010692A6106}">
   <ds:schemaRefs>
     <ds:schemaRef ds:uri="http://schemas.microsoft.com/VisualStudio/2011/storyboarding/control"/>
   </ds:schemaRefs>
@@ -10449,7 +10984,7 @@
 </file>
 
 <file path=customXml/itemProps19.xml><?xml version="1.0" encoding="utf-8"?>
-<ds:datastoreItem xmlns:ds="http://schemas.openxmlformats.org/officeDocument/2006/customXml" ds:itemID="{55094CDB-2A74-4FBE-902E-908BB32F232D}">
+<ds:datastoreItem xmlns:ds="http://schemas.openxmlformats.org/officeDocument/2006/customXml" ds:itemID="{5E894C71-B2DA-46E2-B5A7-3A1C3D5DB5B8}">
   <ds:schemaRefs>
     <ds:schemaRef ds:uri="http://schemas.microsoft.com/VisualStudio/2011/storyboarding/control"/>
   </ds:schemaRefs>
@@ -10465,6 +11000,94 @@
 </file>
 
 <file path=customXml/itemProps20.xml><?xml version="1.0" encoding="utf-8"?>
+<ds:datastoreItem xmlns:ds="http://schemas.openxmlformats.org/officeDocument/2006/customXml" ds:itemID="{06C2D9AE-7534-4FAD-A8C5-335E417D83FF}">
+  <ds:schemaRefs>
+    <ds:schemaRef ds:uri="http://schemas.microsoft.com/VisualStudio/2011/storyboarding/control"/>
+  </ds:schemaRefs>
+</ds:datastoreItem>
+</file>
+
+<file path=customXml/itemProps21.xml><?xml version="1.0" encoding="utf-8"?>
+<ds:datastoreItem xmlns:ds="http://schemas.openxmlformats.org/officeDocument/2006/customXml" ds:itemID="{3A9E3F93-02A4-4356-BBC6-A7BD971C5367}">
+  <ds:schemaRefs>
+    <ds:schemaRef ds:uri="http://schemas.microsoft.com/VisualStudio/2011/storyboarding/control"/>
+  </ds:schemaRefs>
+</ds:datastoreItem>
+</file>
+
+<file path=customXml/itemProps22.xml><?xml version="1.0" encoding="utf-8"?>
+<ds:datastoreItem xmlns:ds="http://schemas.openxmlformats.org/officeDocument/2006/customXml" ds:itemID="{ED3F02EF-3CEC-4FA2-ABA7-55430503271A}">
+  <ds:schemaRefs>
+    <ds:schemaRef ds:uri="http://schemas.microsoft.com/VisualStudio/2011/storyboarding/control"/>
+  </ds:schemaRefs>
+</ds:datastoreItem>
+</file>
+
+<file path=customXml/itemProps23.xml><?xml version="1.0" encoding="utf-8"?>
+<ds:datastoreItem xmlns:ds="http://schemas.openxmlformats.org/officeDocument/2006/customXml" ds:itemID="{C9CD690E-579D-4787-85BC-0470699F0591}">
+  <ds:schemaRefs>
+    <ds:schemaRef ds:uri="http://schemas.microsoft.com/VisualStudio/2011/storyboarding/control"/>
+  </ds:schemaRefs>
+</ds:datastoreItem>
+</file>
+
+<file path=customXml/itemProps24.xml><?xml version="1.0" encoding="utf-8"?>
+<ds:datastoreItem xmlns:ds="http://schemas.openxmlformats.org/officeDocument/2006/customXml" ds:itemID="{5DDEC329-F8A0-4AB7-A43D-EBCA2E0A9F0A}">
+  <ds:schemaRefs>
+    <ds:schemaRef ds:uri="http://schemas.microsoft.com/VisualStudio/2011/storyboarding/control"/>
+  </ds:schemaRefs>
+</ds:datastoreItem>
+</file>
+
+<file path=customXml/itemProps25.xml><?xml version="1.0" encoding="utf-8"?>
+<ds:datastoreItem xmlns:ds="http://schemas.openxmlformats.org/officeDocument/2006/customXml" ds:itemID="{3F793D20-BE72-4C4B-9D26-502AA3F72ECF}">
+  <ds:schemaRefs>
+    <ds:schemaRef ds:uri="http://schemas.microsoft.com/VisualStudio/2011/storyboarding/control"/>
+  </ds:schemaRefs>
+</ds:datastoreItem>
+</file>
+
+<file path=customXml/itemProps26.xml><?xml version="1.0" encoding="utf-8"?>
+<ds:datastoreItem xmlns:ds="http://schemas.openxmlformats.org/officeDocument/2006/customXml" ds:itemID="{A1B816BD-20A9-4267-9EEE-68B4093B883C}">
+  <ds:schemaRefs>
+    <ds:schemaRef ds:uri="http://schemas.microsoft.com/VisualStudio/2011/storyboarding/control"/>
+  </ds:schemaRefs>
+</ds:datastoreItem>
+</file>
+
+<file path=customXml/itemProps27.xml><?xml version="1.0" encoding="utf-8"?>
+<ds:datastoreItem xmlns:ds="http://schemas.openxmlformats.org/officeDocument/2006/customXml" ds:itemID="{659039C9-9E57-4631-A7B7-C4066315FAF6}">
+  <ds:schemaRefs>
+    <ds:schemaRef ds:uri="http://schemas.microsoft.com/VisualStudio/2011/storyboarding/control"/>
+  </ds:schemaRefs>
+</ds:datastoreItem>
+</file>
+
+<file path=customXml/itemProps28.xml><?xml version="1.0" encoding="utf-8"?>
+<ds:datastoreItem xmlns:ds="http://schemas.openxmlformats.org/officeDocument/2006/customXml" ds:itemID="{5A3CA955-CC15-445A-BB94-545C151A46CB}">
+  <ds:schemaRefs>
+    <ds:schemaRef ds:uri="http://schemas.microsoft.com/VisualStudio/2011/storyboarding/control"/>
+  </ds:schemaRefs>
+</ds:datastoreItem>
+</file>
+
+<file path=customXml/itemProps29.xml><?xml version="1.0" encoding="utf-8"?>
+<ds:datastoreItem xmlns:ds="http://schemas.openxmlformats.org/officeDocument/2006/customXml" ds:itemID="{CF84A91D-8176-4C11-BA36-9F0BAC5B93DD}">
+  <ds:schemaRefs>
+    <ds:schemaRef ds:uri="http://schemas.microsoft.com/VisualStudio/2011/storyboarding/control"/>
+  </ds:schemaRefs>
+</ds:datastoreItem>
+</file>
+
+<file path=customXml/itemProps3.xml><?xml version="1.0" encoding="utf-8"?>
+<ds:datastoreItem xmlns:ds="http://schemas.openxmlformats.org/officeDocument/2006/customXml" ds:itemID="{D3B48954-D3FD-48DF-BABD-6FC53C1FE557}">
+  <ds:schemaRefs>
+    <ds:schemaRef ds:uri="http://schemas.microsoft.com/VisualStudio/2011/storyboarding/control"/>
+  </ds:schemaRefs>
+</ds:datastoreItem>
+</file>
+
+<file path=customXml/itemProps30.xml><?xml version="1.0" encoding="utf-8"?>
 <ds:datastoreItem xmlns:ds="http://schemas.openxmlformats.org/officeDocument/2006/customXml" ds:itemID="{40E1E962-5637-4EB6-B93C-DA8F96A81FAF}">
   <ds:schemaRefs>
     <ds:schemaRef ds:uri="http://schemas.microsoft.com/VisualStudio/2011/storyboarding/control"/>
@@ -10472,7 +11095,159 @@
 </ds:datastoreItem>
 </file>
 
-<file path=customXml/itemProps21.xml><?xml version="1.0" encoding="utf-8"?>
+<file path=customXml/itemProps31.xml><?xml version="1.0" encoding="utf-8"?>
+<ds:datastoreItem xmlns:ds="http://schemas.openxmlformats.org/officeDocument/2006/customXml" ds:itemID="{27E32971-DE1A-4E07-8036-1C43278AB1CE}">
+  <ds:schemaRefs>
+    <ds:schemaRef ds:uri="http://schemas.microsoft.com/VisualStudio/2011/storyboarding/control"/>
+  </ds:schemaRefs>
+</ds:datastoreItem>
+</file>
+
+<file path=customXml/itemProps32.xml><?xml version="1.0" encoding="utf-8"?>
+<ds:datastoreItem xmlns:ds="http://schemas.openxmlformats.org/officeDocument/2006/customXml" ds:itemID="{831CC1F3-48E3-4367-AA27-BFB6D7A37182}">
+  <ds:schemaRefs>
+    <ds:schemaRef ds:uri="http://schemas.microsoft.com/VisualStudio/2011/storyboarding/control"/>
+  </ds:schemaRefs>
+</ds:datastoreItem>
+</file>
+
+<file path=customXml/itemProps33.xml><?xml version="1.0" encoding="utf-8"?>
+<ds:datastoreItem xmlns:ds="http://schemas.openxmlformats.org/officeDocument/2006/customXml" ds:itemID="{9501DC5F-120C-4F65-9B9C-A042818517A5}">
+  <ds:schemaRefs>
+    <ds:schemaRef ds:uri="http://schemas.microsoft.com/VisualStudio/2011/storyboarding/control"/>
+  </ds:schemaRefs>
+</ds:datastoreItem>
+</file>
+
+<file path=customXml/itemProps34.xml><?xml version="1.0" encoding="utf-8"?>
+<ds:datastoreItem xmlns:ds="http://schemas.openxmlformats.org/officeDocument/2006/customXml" ds:itemID="{C81C1EAF-5573-4252-ABC3-FCE2BB949409}">
+  <ds:schemaRefs>
+    <ds:schemaRef ds:uri="http://schemas.microsoft.com/VisualStudio/2011/storyboarding/control"/>
+  </ds:schemaRefs>
+</ds:datastoreItem>
+</file>
+
+<file path=customXml/itemProps35.xml><?xml version="1.0" encoding="utf-8"?>
+<ds:datastoreItem xmlns:ds="http://schemas.openxmlformats.org/officeDocument/2006/customXml" ds:itemID="{2238C136-D227-4AA1-A465-1D5076A289E6}">
+  <ds:schemaRefs>
+    <ds:schemaRef ds:uri="http://schemas.microsoft.com/VisualStudio/2011/storyboarding/control"/>
+  </ds:schemaRefs>
+</ds:datastoreItem>
+</file>
+
+<file path=customXml/itemProps36.xml><?xml version="1.0" encoding="utf-8"?>
+<ds:datastoreItem xmlns:ds="http://schemas.openxmlformats.org/officeDocument/2006/customXml" ds:itemID="{F3F355F8-D936-4AFD-818D-52B5131B2DE1}">
+  <ds:schemaRefs>
+    <ds:schemaRef ds:uri="http://schemas.microsoft.com/VisualStudio/2011/storyboarding/control"/>
+  </ds:schemaRefs>
+</ds:datastoreItem>
+</file>
+
+<file path=customXml/itemProps37.xml><?xml version="1.0" encoding="utf-8"?>
+<ds:datastoreItem xmlns:ds="http://schemas.openxmlformats.org/officeDocument/2006/customXml" ds:itemID="{B0D39E60-4C78-477F-973B-B3A32CF1CE06}">
+  <ds:schemaRefs>
+    <ds:schemaRef ds:uri="http://schemas.microsoft.com/VisualStudio/2011/storyboarding/control"/>
+  </ds:schemaRefs>
+</ds:datastoreItem>
+</file>
+
+<file path=customXml/itemProps38.xml><?xml version="1.0" encoding="utf-8"?>
+<ds:datastoreItem xmlns:ds="http://schemas.openxmlformats.org/officeDocument/2006/customXml" ds:itemID="{E621F820-782A-4D55-A65D-5B9683D8D158}">
+  <ds:schemaRefs>
+    <ds:schemaRef ds:uri="http://schemas.microsoft.com/VisualStudio/2011/storyboarding/control"/>
+  </ds:schemaRefs>
+</ds:datastoreItem>
+</file>
+
+<file path=customXml/itemProps39.xml><?xml version="1.0" encoding="utf-8"?>
+<ds:datastoreItem xmlns:ds="http://schemas.openxmlformats.org/officeDocument/2006/customXml" ds:itemID="{C76B3611-00D2-4D8A-81E2-3DAAC702EE04}">
+  <ds:schemaRefs>
+    <ds:schemaRef ds:uri="http://schemas.microsoft.com/VisualStudio/2011/storyboarding/control"/>
+  </ds:schemaRefs>
+</ds:datastoreItem>
+</file>
+
+<file path=customXml/itemProps4.xml><?xml version="1.0" encoding="utf-8"?>
+<ds:datastoreItem xmlns:ds="http://schemas.openxmlformats.org/officeDocument/2006/customXml" ds:itemID="{C4B39F5D-B3F1-470B-8B1A-5B666FAECEC8}">
+  <ds:schemaRefs>
+    <ds:schemaRef ds:uri="http://schemas.microsoft.com/VisualStudio/2011/storyboarding/control"/>
+  </ds:schemaRefs>
+</ds:datastoreItem>
+</file>
+
+<file path=customXml/itemProps40.xml><?xml version="1.0" encoding="utf-8"?>
+<ds:datastoreItem xmlns:ds="http://schemas.openxmlformats.org/officeDocument/2006/customXml" ds:itemID="{7189590F-1A48-46F3-B24A-D8D0F3BA0A15}">
+  <ds:schemaRefs>
+    <ds:schemaRef ds:uri="http://schemas.microsoft.com/VisualStudio/2011/storyboarding/control"/>
+  </ds:schemaRefs>
+</ds:datastoreItem>
+</file>
+
+<file path=customXml/itemProps41.xml><?xml version="1.0" encoding="utf-8"?>
+<ds:datastoreItem xmlns:ds="http://schemas.openxmlformats.org/officeDocument/2006/customXml" ds:itemID="{26190532-7283-4B3A-A4F0-D4225A0BC43D}">
+  <ds:schemaRefs>
+    <ds:schemaRef ds:uri="http://schemas.microsoft.com/VisualStudio/2011/storyboarding/control"/>
+  </ds:schemaRefs>
+</ds:datastoreItem>
+</file>
+
+<file path=customXml/itemProps42.xml><?xml version="1.0" encoding="utf-8"?>
+<ds:datastoreItem xmlns:ds="http://schemas.openxmlformats.org/officeDocument/2006/customXml" ds:itemID="{D42EC927-BD14-4EEB-A2C7-7B41724D5817}">
+  <ds:schemaRefs>
+    <ds:schemaRef ds:uri="http://schemas.microsoft.com/VisualStudio/2011/storyboarding/control"/>
+  </ds:schemaRefs>
+</ds:datastoreItem>
+</file>
+
+<file path=customXml/itemProps43.xml><?xml version="1.0" encoding="utf-8"?>
+<ds:datastoreItem xmlns:ds="http://schemas.openxmlformats.org/officeDocument/2006/customXml" ds:itemID="{C0236D38-7F8A-4EAA-B6A1-6880B56FE83E}">
+  <ds:schemaRefs>
+    <ds:schemaRef ds:uri="http://schemas.microsoft.com/VisualStudio/2011/storyboarding/control"/>
+  </ds:schemaRefs>
+</ds:datastoreItem>
+</file>
+
+<file path=customXml/itemProps44.xml><?xml version="1.0" encoding="utf-8"?>
+<ds:datastoreItem xmlns:ds="http://schemas.openxmlformats.org/officeDocument/2006/customXml" ds:itemID="{CFD780DE-34AD-4E8E-9D17-223D69561496}">
+  <ds:schemaRefs>
+    <ds:schemaRef ds:uri="http://schemas.microsoft.com/VisualStudio/2011/storyboarding/control"/>
+  </ds:schemaRefs>
+</ds:datastoreItem>
+</file>
+
+<file path=customXml/itemProps45.xml><?xml version="1.0" encoding="utf-8"?>
+<ds:datastoreItem xmlns:ds="http://schemas.openxmlformats.org/officeDocument/2006/customXml" ds:itemID="{DE293149-9CCD-457B-84DE-7E7B56E1FEFC}">
+  <ds:schemaRefs>
+    <ds:schemaRef ds:uri="http://schemas.microsoft.com/VisualStudio/2011/storyboarding/control"/>
+  </ds:schemaRefs>
+</ds:datastoreItem>
+</file>
+
+<file path=customXml/itemProps46.xml><?xml version="1.0" encoding="utf-8"?>
+<ds:datastoreItem xmlns:ds="http://schemas.openxmlformats.org/officeDocument/2006/customXml" ds:itemID="{F3D1B56C-1098-4BDA-B23F-5C6F926B691C}">
+  <ds:schemaRefs>
+    <ds:schemaRef ds:uri="http://schemas.microsoft.com/VisualStudio/2011/storyboarding/control"/>
+  </ds:schemaRefs>
+</ds:datastoreItem>
+</file>
+
+<file path=customXml/itemProps47.xml><?xml version="1.0" encoding="utf-8"?>
+<ds:datastoreItem xmlns:ds="http://schemas.openxmlformats.org/officeDocument/2006/customXml" ds:itemID="{380758EA-E49E-4704-9569-4087603CA842}">
+  <ds:schemaRefs>
+    <ds:schemaRef ds:uri="http://schemas.microsoft.com/VisualStudio/2011/storyboarding/control"/>
+  </ds:schemaRefs>
+</ds:datastoreItem>
+</file>
+
+<file path=customXml/itemProps48.xml><?xml version="1.0" encoding="utf-8"?>
+<ds:datastoreItem xmlns:ds="http://schemas.openxmlformats.org/officeDocument/2006/customXml" ds:itemID="{01BBD822-2486-4BAB-8BE0-43BC08D35C57}">
+  <ds:schemaRefs>
+    <ds:schemaRef ds:uri="http://schemas.microsoft.com/VisualStudio/2011/storyboarding/control"/>
+  </ds:schemaRefs>
+</ds:datastoreItem>
+</file>
+
+<file path=customXml/itemProps49.xml><?xml version="1.0" encoding="utf-8"?>
 <ds:datastoreItem xmlns:ds="http://schemas.openxmlformats.org/officeDocument/2006/customXml" ds:itemID="{FD188300-81E8-4775-8131-2C284D97ABB2}">
   <ds:schemaRefs>
     <ds:schemaRef ds:uri="http://schemas.microsoft.com/VisualStudio/2011/storyboarding/control"/>
@@ -10480,23 +11255,95 @@
 </ds:datastoreItem>
 </file>
 
-<file path=customXml/itemProps22.xml><?xml version="1.0" encoding="utf-8"?>
-<ds:datastoreItem xmlns:ds="http://schemas.openxmlformats.org/officeDocument/2006/customXml" ds:itemID="{004B09A5-32AD-4CCB-8361-A2EF01A5A068}">
+<file path=customXml/itemProps5.xml><?xml version="1.0" encoding="utf-8"?>
+<ds:datastoreItem xmlns:ds="http://schemas.openxmlformats.org/officeDocument/2006/customXml" ds:itemID="{6C142DB8-4046-4E2F-87C2-7EBCDA60703A}">
   <ds:schemaRefs>
     <ds:schemaRef ds:uri="http://schemas.microsoft.com/VisualStudio/2011/storyboarding/control"/>
   </ds:schemaRefs>
 </ds:datastoreItem>
 </file>
 
-<file path=customXml/itemProps23.xml><?xml version="1.0" encoding="utf-8"?>
-<ds:datastoreItem xmlns:ds="http://schemas.openxmlformats.org/officeDocument/2006/customXml" ds:itemID="{2238C136-D227-4AA1-A465-1D5076A289E6}">
+<file path=customXml/itemProps50.xml><?xml version="1.0" encoding="utf-8"?>
+<ds:datastoreItem xmlns:ds="http://schemas.openxmlformats.org/officeDocument/2006/customXml" ds:itemID="{4634477D-D8CC-4869-941E-D079C4C3EEF8}">
   <ds:schemaRefs>
     <ds:schemaRef ds:uri="http://schemas.microsoft.com/VisualStudio/2011/storyboarding/control"/>
   </ds:schemaRefs>
 </ds:datastoreItem>
 </file>
 
-<file path=customXml/itemProps24.xml><?xml version="1.0" encoding="utf-8"?>
+<file path=customXml/itemProps51.xml><?xml version="1.0" encoding="utf-8"?>
+<ds:datastoreItem xmlns:ds="http://schemas.openxmlformats.org/officeDocument/2006/customXml" ds:itemID="{798E1A44-C6DC-4F6B-8062-CEEC518F1F18}">
+  <ds:schemaRefs>
+    <ds:schemaRef ds:uri="http://schemas.microsoft.com/VisualStudio/2011/storyboarding/control"/>
+  </ds:schemaRefs>
+</ds:datastoreItem>
+</file>
+
+<file path=customXml/itemProps52.xml><?xml version="1.0" encoding="utf-8"?>
+<ds:datastoreItem xmlns:ds="http://schemas.openxmlformats.org/officeDocument/2006/customXml" ds:itemID="{1C7801AE-0A4F-4BE1-AE83-D4ED8E0DEB9E}">
+  <ds:schemaRefs>
+    <ds:schemaRef ds:uri="http://schemas.microsoft.com/VisualStudio/2011/storyboarding/control"/>
+  </ds:schemaRefs>
+</ds:datastoreItem>
+</file>
+
+<file path=customXml/itemProps53.xml><?xml version="1.0" encoding="utf-8"?>
+<ds:datastoreItem xmlns:ds="http://schemas.openxmlformats.org/officeDocument/2006/customXml" ds:itemID="{D9F1C4B6-E0F0-4CEE-BD7B-F93BD5842C1D}">
+  <ds:schemaRefs>
+    <ds:schemaRef ds:uri="http://schemas.microsoft.com/VisualStudio/2011/storyboarding/control"/>
+  </ds:schemaRefs>
+</ds:datastoreItem>
+</file>
+
+<file path=customXml/itemProps54.xml><?xml version="1.0" encoding="utf-8"?>
+<ds:datastoreItem xmlns:ds="http://schemas.openxmlformats.org/officeDocument/2006/customXml" ds:itemID="{454EE663-ABEC-4DCB-88C3-A6F9DAB3AFEB}">
+  <ds:schemaRefs>
+    <ds:schemaRef ds:uri="http://schemas.microsoft.com/VisualStudio/2011/storyboarding/control"/>
+  </ds:schemaRefs>
+</ds:datastoreItem>
+</file>
+
+<file path=customXml/itemProps55.xml><?xml version="1.0" encoding="utf-8"?>
+<ds:datastoreItem xmlns:ds="http://schemas.openxmlformats.org/officeDocument/2006/customXml" ds:itemID="{03C590B9-05DB-4F5B-99C3-848AED9ACB4E}">
+  <ds:schemaRefs>
+    <ds:schemaRef ds:uri="http://schemas.microsoft.com/VisualStudio/2011/storyboarding/control"/>
+  </ds:schemaRefs>
+</ds:datastoreItem>
+</file>
+
+<file path=customXml/itemProps56.xml><?xml version="1.0" encoding="utf-8"?>
+<ds:datastoreItem xmlns:ds="http://schemas.openxmlformats.org/officeDocument/2006/customXml" ds:itemID="{9FE835D4-D323-4BA8-AC22-67F92BED91C7}">
+  <ds:schemaRefs>
+    <ds:schemaRef ds:uri="http://schemas.microsoft.com/VisualStudio/2011/storyboarding/control"/>
+  </ds:schemaRefs>
+</ds:datastoreItem>
+</file>
+
+<file path=customXml/itemProps57.xml><?xml version="1.0" encoding="utf-8"?>
+<ds:datastoreItem xmlns:ds="http://schemas.openxmlformats.org/officeDocument/2006/customXml" ds:itemID="{B2001CEA-37FA-4A6C-BC64-46726D8508FA}">
+  <ds:schemaRefs>
+    <ds:schemaRef ds:uri="http://schemas.microsoft.com/VisualStudio/2011/storyboarding/control"/>
+  </ds:schemaRefs>
+</ds:datastoreItem>
+</file>
+
+<file path=customXml/itemProps58.xml><?xml version="1.0" encoding="utf-8"?>
+<ds:datastoreItem xmlns:ds="http://schemas.openxmlformats.org/officeDocument/2006/customXml" ds:itemID="{AF85AF10-45D2-4FD3-8FAB-69557E6D8FEE}">
+  <ds:schemaRefs>
+    <ds:schemaRef ds:uri="http://schemas.microsoft.com/VisualStudio/2011/storyboarding/control"/>
+  </ds:schemaRefs>
+</ds:datastoreItem>
+</file>
+
+<file path=customXml/itemProps59.xml><?xml version="1.0" encoding="utf-8"?>
+<ds:datastoreItem xmlns:ds="http://schemas.openxmlformats.org/officeDocument/2006/customXml" ds:itemID="{7CBAB6EC-F3DF-4763-9CFB-476849EF7E97}">
+  <ds:schemaRefs>
+    <ds:schemaRef ds:uri="http://schemas.microsoft.com/VisualStudio/2011/storyboarding/control"/>
+  </ds:schemaRefs>
+</ds:datastoreItem>
+</file>
+
+<file path=customXml/itemProps6.xml><?xml version="1.0" encoding="utf-8"?>
 <ds:datastoreItem xmlns:ds="http://schemas.openxmlformats.org/officeDocument/2006/customXml" ds:itemID="{6D29AD73-E6E7-41AD-BD08-29640567C1E3}">
   <ds:schemaRefs>
     <ds:schemaRef ds:uri="http://schemas.microsoft.com/VisualStudio/2011/storyboarding/control"/>
@@ -10504,71 +11351,15 @@
 </ds:datastoreItem>
 </file>
 
-<file path=customXml/itemProps25.xml><?xml version="1.0" encoding="utf-8"?>
-<ds:datastoreItem xmlns:ds="http://schemas.openxmlformats.org/officeDocument/2006/customXml" ds:itemID="{A1B816BD-20A9-4267-9EEE-68B4093B883C}">
+<file path=customXml/itemProps60.xml><?xml version="1.0" encoding="utf-8"?>
+<ds:datastoreItem xmlns:ds="http://schemas.openxmlformats.org/officeDocument/2006/customXml" ds:itemID="{CB29B50B-07CC-4332-87A3-C7CC606E4217}">
   <ds:schemaRefs>
     <ds:schemaRef ds:uri="http://schemas.microsoft.com/VisualStudio/2011/storyboarding/control"/>
   </ds:schemaRefs>
 </ds:datastoreItem>
 </file>
 
-<file path=customXml/itemProps26.xml><?xml version="1.0" encoding="utf-8"?>
-<ds:datastoreItem xmlns:ds="http://schemas.openxmlformats.org/officeDocument/2006/customXml" ds:itemID="{380758EA-E49E-4704-9569-4087603CA842}">
-  <ds:schemaRefs>
-    <ds:schemaRef ds:uri="http://schemas.microsoft.com/VisualStudio/2011/storyboarding/control"/>
-  </ds:schemaRefs>
-</ds:datastoreItem>
-</file>
-
-<file path=customXml/itemProps27.xml><?xml version="1.0" encoding="utf-8"?>
-<ds:datastoreItem xmlns:ds="http://schemas.openxmlformats.org/officeDocument/2006/customXml" ds:itemID="{59EA028F-946B-4A71-BD84-489D2C1341A2}">
-  <ds:schemaRefs>
-    <ds:schemaRef ds:uri="http://schemas.microsoft.com/VisualStudio/2011/storyboarding/control"/>
-  </ds:schemaRefs>
-</ds:datastoreItem>
-</file>
-
-<file path=customXml/itemProps28.xml><?xml version="1.0" encoding="utf-8"?>
-<ds:datastoreItem xmlns:ds="http://schemas.openxmlformats.org/officeDocument/2006/customXml" ds:itemID="{F3F355F8-D936-4AFD-818D-52B5131B2DE1}">
-  <ds:schemaRefs>
-    <ds:schemaRef ds:uri="http://schemas.microsoft.com/VisualStudio/2011/storyboarding/control"/>
-  </ds:schemaRefs>
-</ds:datastoreItem>
-</file>
-
-<file path=customXml/itemProps29.xml><?xml version="1.0" encoding="utf-8"?>
-<ds:datastoreItem xmlns:ds="http://schemas.openxmlformats.org/officeDocument/2006/customXml" ds:itemID="{C4B39F5D-B3F1-470B-8B1A-5B666FAECEC8}">
-  <ds:schemaRefs>
-    <ds:schemaRef ds:uri="http://schemas.microsoft.com/VisualStudio/2011/storyboarding/control"/>
-  </ds:schemaRefs>
-</ds:datastoreItem>
-</file>
-
-<file path=customXml/itemProps3.xml><?xml version="1.0" encoding="utf-8"?>
-<ds:datastoreItem xmlns:ds="http://schemas.openxmlformats.org/officeDocument/2006/customXml" ds:itemID="{C9CD690E-579D-4787-85BC-0470699F0591}">
-  <ds:schemaRefs>
-    <ds:schemaRef ds:uri="http://schemas.microsoft.com/VisualStudio/2011/storyboarding/control"/>
-  </ds:schemaRefs>
-</ds:datastoreItem>
-</file>
-
-<file path=customXml/itemProps30.xml><?xml version="1.0" encoding="utf-8"?>
-<ds:datastoreItem xmlns:ds="http://schemas.openxmlformats.org/officeDocument/2006/customXml" ds:itemID="{0F67BC1B-C4A3-4EF8-B37F-FD887C9E8AEC}">
-  <ds:schemaRefs>
-    <ds:schemaRef ds:uri="http://schemas.microsoft.com/VisualStudio/2011/storyboarding/control"/>
-  </ds:schemaRefs>
-</ds:datastoreItem>
-</file>
-
-<file path=customXml/itemProps31.xml><?xml version="1.0" encoding="utf-8"?>
-<ds:datastoreItem xmlns:ds="http://schemas.openxmlformats.org/officeDocument/2006/customXml" ds:itemID="{7189590F-1A48-46F3-B24A-D8D0F3BA0A15}">
-  <ds:schemaRefs>
-    <ds:schemaRef ds:uri="http://schemas.microsoft.com/VisualStudio/2011/storyboarding/control"/>
-  </ds:schemaRefs>
-</ds:datastoreItem>
-</file>
-
-<file path=customXml/itemProps32.xml><?xml version="1.0" encoding="utf-8"?>
+<file path=customXml/itemProps7.xml><?xml version="1.0" encoding="utf-8"?>
 <ds:datastoreItem xmlns:ds="http://schemas.openxmlformats.org/officeDocument/2006/customXml" ds:itemID="{6719955E-AEE2-4AED-B5E3-E0ACCFB7F1B1}">
   <ds:schemaRefs>
     <ds:schemaRef ds:uri="http://schemas.microsoft.com/VisualStudio/2011/storyboarding/control"/>
@@ -10576,39 +11367,7 @@
 </ds:datastoreItem>
 </file>
 
-<file path=customXml/itemProps33.xml><?xml version="1.0" encoding="utf-8"?>
-<ds:datastoreItem xmlns:ds="http://schemas.openxmlformats.org/officeDocument/2006/customXml" ds:itemID="{659039C9-9E57-4631-A7B7-C4066315FAF6}">
-  <ds:schemaRefs>
-    <ds:schemaRef ds:uri="http://schemas.microsoft.com/VisualStudio/2011/storyboarding/control"/>
-  </ds:schemaRefs>
-</ds:datastoreItem>
-</file>
-
-<file path=customXml/itemProps34.xml><?xml version="1.0" encoding="utf-8"?>
-<ds:datastoreItem xmlns:ds="http://schemas.openxmlformats.org/officeDocument/2006/customXml" ds:itemID="{4634477D-D8CC-4869-941E-D079C4C3EEF8}">
-  <ds:schemaRefs>
-    <ds:schemaRef ds:uri="http://schemas.microsoft.com/VisualStudio/2011/storyboarding/control"/>
-  </ds:schemaRefs>
-</ds:datastoreItem>
-</file>
-
-<file path=customXml/itemProps35.xml><?xml version="1.0" encoding="utf-8"?>
-<ds:datastoreItem xmlns:ds="http://schemas.openxmlformats.org/officeDocument/2006/customXml" ds:itemID="{9483A2CD-33FC-48E4-A7B5-B010692A6106}">
-  <ds:schemaRefs>
-    <ds:schemaRef ds:uri="http://schemas.microsoft.com/VisualStudio/2011/storyboarding/control"/>
-  </ds:schemaRefs>
-</ds:datastoreItem>
-</file>
-
-<file path=customXml/itemProps36.xml><?xml version="1.0" encoding="utf-8"?>
-<ds:datastoreItem xmlns:ds="http://schemas.openxmlformats.org/officeDocument/2006/customXml" ds:itemID="{B0D39E60-4C78-477F-973B-B3A32CF1CE06}">
-  <ds:schemaRefs>
-    <ds:schemaRef ds:uri="http://schemas.microsoft.com/VisualStudio/2011/storyboarding/control"/>
-  </ds:schemaRefs>
-</ds:datastoreItem>
-</file>
-
-<file path=customXml/itemProps37.xml><?xml version="1.0" encoding="utf-8"?>
+<file path=customXml/itemProps8.xml><?xml version="1.0" encoding="utf-8"?>
 <ds:datastoreItem xmlns:ds="http://schemas.openxmlformats.org/officeDocument/2006/customXml" ds:itemID="{2DEE47C0-36A2-4264-9D02-B43B15FA8FF6}">
   <ds:schemaRefs>
     <ds:schemaRef ds:uri="http://schemas.microsoft.com/VisualStudio/2011/storyboarding/control"/>
@@ -10616,178 +11375,10 @@
 </ds:datastoreItem>
 </file>
 
-<file path=customXml/itemProps38.xml><?xml version="1.0" encoding="utf-8"?>
-<ds:datastoreItem xmlns:ds="http://schemas.openxmlformats.org/officeDocument/2006/customXml" ds:itemID="{5A3CA955-CC15-445A-BB94-545C151A46CB}">
-  <ds:schemaRefs>
-    <ds:schemaRef ds:uri="http://schemas.microsoft.com/VisualStudio/2011/storyboarding/control"/>
-  </ds:schemaRefs>
-</ds:datastoreItem>
-</file>
-
-<file path=customXml/itemProps39.xml><?xml version="1.0" encoding="utf-8"?>
-<ds:datastoreItem xmlns:ds="http://schemas.openxmlformats.org/officeDocument/2006/customXml" ds:itemID="{01BBD822-2486-4BAB-8BE0-43BC08D35C57}">
-  <ds:schemaRefs>
-    <ds:schemaRef ds:uri="http://schemas.microsoft.com/VisualStudio/2011/storyboarding/control"/>
-  </ds:schemaRefs>
-</ds:datastoreItem>
-</file>
-
-<file path=customXml/itemProps4.xml><?xml version="1.0" encoding="utf-8"?>
-<ds:datastoreItem xmlns:ds="http://schemas.openxmlformats.org/officeDocument/2006/customXml" ds:itemID="{C0236D38-7F8A-4EAA-B6A1-6880B56FE83E}">
-  <ds:schemaRefs>
-    <ds:schemaRef ds:uri="http://schemas.microsoft.com/VisualStudio/2011/storyboarding/control"/>
-  </ds:schemaRefs>
-</ds:datastoreItem>
-</file>
-
-<file path=customXml/itemProps40.xml><?xml version="1.0" encoding="utf-8"?>
+<file path=customXml/itemProps9.xml><?xml version="1.0" encoding="utf-8"?>
 <ds:datastoreItem xmlns:ds="http://schemas.openxmlformats.org/officeDocument/2006/customXml" ds:itemID="{2BCE60B8-8680-4092-BEC8-78942EDE6BF3}">
   <ds:schemaRefs>
     <ds:schemaRef ds:uri="http://schemas.microsoft.com/VisualStudio/2011/storyboarding/control"/>
   </ds:schemaRefs>
 </ds:datastoreItem>
-</file>
-
-<file path=customXml/itemProps41.xml><?xml version="1.0" encoding="utf-8"?>
-<ds:datastoreItem xmlns:ds="http://schemas.openxmlformats.org/officeDocument/2006/customXml" ds:itemID="{27E32971-DE1A-4E07-8036-1C43278AB1CE}">
-  <ds:schemaRefs>
-    <ds:schemaRef ds:uri="http://schemas.microsoft.com/VisualStudio/2011/storyboarding/control"/>
-  </ds:schemaRefs>
-</ds:datastoreItem>
-</file>
-
-<file path=customXml/itemProps42.xml><?xml version="1.0" encoding="utf-8"?>
-<ds:datastoreItem xmlns:ds="http://schemas.openxmlformats.org/officeDocument/2006/customXml" ds:itemID="{798E1A44-C6DC-4F6B-8062-CEEC518F1F18}">
-  <ds:schemaRefs>
-    <ds:schemaRef ds:uri="http://schemas.microsoft.com/VisualStudio/2011/storyboarding/control"/>
-  </ds:schemaRefs>
-</ds:datastoreItem>
-</file>
-
-<file path=customXml/itemProps43.xml><?xml version="1.0" encoding="utf-8"?>
-<ds:datastoreItem xmlns:ds="http://schemas.openxmlformats.org/officeDocument/2006/customXml" ds:itemID="{5E894C71-B2DA-46E2-B5A7-3A1C3D5DB5B8}">
-  <ds:schemaRefs>
-    <ds:schemaRef ds:uri="http://schemas.microsoft.com/VisualStudio/2011/storyboarding/control"/>
-  </ds:schemaRefs>
-</ds:datastoreItem>
-</file>
-
-<file path=customXml/itemProps44.xml><?xml version="1.0" encoding="utf-8"?>
-<ds:datastoreItem xmlns:ds="http://schemas.openxmlformats.org/officeDocument/2006/customXml" ds:itemID="{26190532-7283-4B3A-A4F0-D4225A0BC43D}">
-  <ds:schemaRefs>
-    <ds:schemaRef ds:uri="http://schemas.microsoft.com/VisualStudio/2011/storyboarding/control"/>
-  </ds:schemaRefs>
-</ds:datastoreItem>
-</file>
-
-<file path=customXml/itemProps45.xml><?xml version="1.0" encoding="utf-8"?>
-<ds:datastoreItem xmlns:ds="http://schemas.openxmlformats.org/officeDocument/2006/customXml" ds:itemID="{36EDA764-43F5-4C83-A43C-7C11C84EB100}">
-  <ds:schemaRefs>
-    <ds:schemaRef ds:uri="http://schemas.microsoft.com/VisualStudio/2011/storyboarding/control"/>
-  </ds:schemaRefs>
-</ds:datastoreItem>
-</file>
-
-<file path=customXml/itemProps46.xml><?xml version="1.0" encoding="utf-8"?>
-<ds:datastoreItem xmlns:ds="http://schemas.openxmlformats.org/officeDocument/2006/customXml" ds:itemID="{CF84A91D-8176-4C11-BA36-9F0BAC5B93DD}">
-  <ds:schemaRefs>
-    <ds:schemaRef ds:uri="http://schemas.microsoft.com/VisualStudio/2011/storyboarding/control"/>
-  </ds:schemaRefs>
-</ds:datastoreItem>
-</file>
-
-<file path=customXml/itemProps47.xml><?xml version="1.0" encoding="utf-8"?>
-<ds:datastoreItem xmlns:ds="http://schemas.openxmlformats.org/officeDocument/2006/customXml" ds:itemID="{1C7801AE-0A4F-4BE1-AE83-D4ED8E0DEB9E}">
-  <ds:schemaRefs>
-    <ds:schemaRef ds:uri="http://schemas.microsoft.com/VisualStudio/2011/storyboarding/control"/>
-  </ds:schemaRefs>
-</ds:datastoreItem>
-</file>
-
-<file path=customXml/itemProps48.xml><?xml version="1.0" encoding="utf-8"?>
-<ds:datastoreItem xmlns:ds="http://schemas.openxmlformats.org/officeDocument/2006/customXml" ds:itemID="{06C2D9AE-7534-4FAD-A8C5-335E417D83FF}">
-  <ds:schemaRefs>
-    <ds:schemaRef ds:uri="http://schemas.microsoft.com/VisualStudio/2011/storyboarding/control"/>
-  </ds:schemaRefs>
-</ds:datastoreItem>
-</file>
-
-<file path=customXml/itemProps49.xml><?xml version="1.0" encoding="utf-8"?>
-<ds:datastoreItem xmlns:ds="http://schemas.openxmlformats.org/officeDocument/2006/customXml" ds:itemID="{E621F820-782A-4D55-A65D-5B9683D8D158}">
-  <ds:schemaRefs>
-    <ds:schemaRef ds:uri="http://schemas.microsoft.com/VisualStudio/2011/storyboarding/control"/>
-  </ds:schemaRefs>
-</ds:datastoreItem>
-</file>
-
-<file path=customXml/itemProps5.xml><?xml version="1.0" encoding="utf-8"?>
-<ds:datastoreItem xmlns:ds="http://schemas.openxmlformats.org/officeDocument/2006/customXml" ds:itemID="{FEEE37C0-7C52-4B75-B817-78E5E594B56F}">
-  <ds:schemaRefs>
-    <ds:schemaRef ds:uri="http://schemas.microsoft.com/VisualStudio/2011/storyboarding/control"/>
-  </ds:schemaRefs>
-</ds:datastoreItem>
-</file>
-
-<file path=customXml/itemProps50.xml><?xml version="1.0" encoding="utf-8"?>
-<ds:datastoreItem xmlns:ds="http://schemas.openxmlformats.org/officeDocument/2006/customXml" ds:itemID="{D9F1C4B6-E0F0-4CEE-BD7B-F93BD5842C1D}">
-  <ds:schemaRefs>
-    <ds:schemaRef ds:uri="http://schemas.microsoft.com/VisualStudio/2011/storyboarding/control"/>
-  </ds:schemaRefs>
-</ds:datastoreItem>
-</file>
-
-<file path=customXml/itemProps51.xml><?xml version="1.0" encoding="utf-8"?>
-<ds:datastoreItem xmlns:ds="http://schemas.openxmlformats.org/officeDocument/2006/customXml" ds:itemID="{ED3F02EF-3CEC-4FA2-ABA7-55430503271A}">
-  <ds:schemaRefs>
-    <ds:schemaRef ds:uri="http://schemas.microsoft.com/VisualStudio/2011/storyboarding/control"/>
-  </ds:schemaRefs>
-</ds:datastoreItem>
-</file>
-
-<file path=customXml/itemProps52.xml><?xml version="1.0" encoding="utf-8"?>
-<ds:datastoreItem xmlns:ds="http://schemas.openxmlformats.org/officeDocument/2006/customXml" ds:itemID="{D42EC927-BD14-4EEB-A2C7-7B41724D5817}">
-  <ds:schemaRefs>
-    <ds:schemaRef ds:uri="http://schemas.microsoft.com/VisualStudio/2011/storyboarding/control"/>
-  </ds:schemaRefs>
-</ds:datastoreItem>
-</file>
-
-<file path=customXml/itemProps53.xml><?xml version="1.0" encoding="utf-8"?>
-<ds:datastoreItem xmlns:ds="http://schemas.openxmlformats.org/officeDocument/2006/customXml" ds:itemID="{571678DC-267F-47C2-A3B2-F591F73394A5}">
-  <ds:schemaRefs>
-    <ds:schemaRef ds:uri="http://schemas.microsoft.com/VisualStudio/2011/storyboarding/control"/>
-  </ds:schemaRefs>
-</ds:datastoreItem>
-</file>
-
-<file path=customXml/itemProps6.xml><?xml version="1.0" encoding="utf-8"?>
-<ds:datastoreItem xmlns:ds="http://schemas.openxmlformats.org/officeDocument/2006/customXml" ds:itemID="{9501DC5F-120C-4F65-9B9C-A042818517A5}">
-  <ds:schemaRefs>
-    <ds:schemaRef ds:uri="http://schemas.microsoft.com/VisualStudio/2011/storyboarding/control"/>
-  </ds:schemaRefs>
-</ds:datastoreItem>
-</file>
-
-<file path=customXml/itemProps7.xml><?xml version="1.0" encoding="utf-8"?>
-<ds:datastoreItem xmlns:ds="http://schemas.openxmlformats.org/officeDocument/2006/customXml" ds:itemID="{190EBEF0-CB9E-4C67-BBD3-192F9F5BB87E}">
-  <ds:schemaRefs>
-    <ds:schemaRef ds:uri="http://schemas.microsoft.com/VisualStudio/2011/storyboarding/control"/>
-  </ds:schemaRefs>
-</ds:datastoreItem>
-</file>
-
-<file path=customXml/itemProps8.xml><?xml version="1.0" encoding="utf-8"?>
-<ds:datastoreItem xmlns:ds="http://schemas.openxmlformats.org/officeDocument/2006/customXml" ds:itemID="{3A9E3F93-02A4-4356-BBC6-A7BD971C5367}">
-  <ds:schemaRefs>
-    <ds:schemaRef ds:uri="http://schemas.microsoft.com/VisualStudio/2011/storyboarding/control"/>
-  </ds:schemaRefs>
-</ds:datastoreItem>
-</file>
-
-<file path=customXml/itemProps9.xml><?xml version="1.0" encoding="utf-8"?>
-<ds:datastoreItem xmlns:ds="http://schemas.openxmlformats.org/officeDocument/2006/customXml" ds:itemID="{CFD780DE-34AD-4E8E-9D17-223D69561496}">
-  <ds:schemaRefs>
-    <ds:schemaRef ds:uri="http://schemas.microsoft.com/VisualStudio/2011/storyboarding/control"/>
-  </ds:schemaRefs>
-</ds:datastoreItem>
 </file>
</xml_diff>